<commit_message>
Update Problem2-3 Oil Figure
</commit_message>
<xml_diff>
--- a/Figures.pptx
+++ b/Figures.pptx
@@ -5,15 +5,15 @@
     <p:sldMasterId id="2147483648" r:id="rId1"/>
   </p:sldMasterIdLst>
   <p:notesMasterIdLst>
-    <p:notesMasterId r:id="rId5"/>
+    <p:notesMasterId r:id="rId8"/>
   </p:notesMasterIdLst>
   <p:sldIdLst>
-    <p:sldId id="256" r:id="rId3"/>
-    <p:sldId id="258" r:id="rId4"/>
-    <p:sldId id="259" r:id="rId6"/>
-    <p:sldId id="260" r:id="rId7"/>
-    <p:sldId id="262" r:id="rId8"/>
-    <p:sldId id="263" r:id="rId9"/>
+    <p:sldId id="256" r:id="rId2"/>
+    <p:sldId id="258" r:id="rId3"/>
+    <p:sldId id="259" r:id="rId4"/>
+    <p:sldId id="260" r:id="rId5"/>
+    <p:sldId id="262" r:id="rId6"/>
+    <p:sldId id="263" r:id="rId7"/>
   </p:sldIdLst>
   <p:sldSz cx="12192000" cy="6858000"/>
   <p:notesSz cx="6858000" cy="9144000"/>
@@ -112,6 +112,11 @@
       </a:defRPr>
     </a:lvl9pPr>
   </p:defaultTextStyle>
+  <p:extLst>
+    <p:ext uri="{EFAFB233-063F-42B5-8137-9DF3F51BA10A}">
+      <p15:sldGuideLst xmlns:p15="http://schemas.microsoft.com/office/powerpoint/2012/main"/>
+    </p:ext>
+  </p:extLst>
 </p:presentation>
 </file>
 
@@ -197,6 +202,7 @@
           <a:p>
             <a:fld id="{37C0385F-9857-4EBC-B12B-077032DC4A24}" type="datetimeFigureOut">
               <a:rPr lang="zh-CN" altLang="en-US" smtClean="0"/>
+              <a:t>2020/9/19</a:t>
             </a:fld>
             <a:endParaRPr lang="zh-CN" altLang="en-US"/>
           </a:p>
@@ -263,7 +269,6 @@
               <a:rPr lang="en-US" altLang="zh-CN"/>
               <a:t>Click to edit Master text styles</a:t>
             </a:r>
-            <a:endParaRPr lang="en-US" altLang="zh-CN"/>
           </a:p>
           <a:p>
             <a:pPr lvl="1"/>
@@ -271,7 +276,6 @@
               <a:rPr lang="en-US" altLang="zh-CN"/>
               <a:t>Second level</a:t>
             </a:r>
-            <a:endParaRPr lang="en-US" altLang="zh-CN"/>
           </a:p>
           <a:p>
             <a:pPr lvl="2"/>
@@ -279,7 +283,6 @@
               <a:rPr lang="en-US" altLang="zh-CN"/>
               <a:t>Third level</a:t>
             </a:r>
-            <a:endParaRPr lang="en-US" altLang="zh-CN"/>
           </a:p>
           <a:p>
             <a:pPr lvl="3"/>
@@ -287,7 +290,6 @@
               <a:rPr lang="en-US" altLang="zh-CN"/>
               <a:t>Fourth level</a:t>
             </a:r>
-            <a:endParaRPr lang="en-US" altLang="zh-CN"/>
           </a:p>
           <a:p>
             <a:pPr lvl="4"/>
@@ -359,6 +361,7 @@
           <a:p>
             <a:fld id="{12FE7FD0-BB34-40C4-BAE1-9991ACF139AC}" type="slidenum">
               <a:rPr lang="zh-CN" altLang="en-US" smtClean="0"/>
+              <a:t>‹#›</a:t>
             </a:fld>
             <a:endParaRPr lang="zh-CN" altLang="en-US"/>
           </a:p>
@@ -527,6 +530,7 @@
           <a:p>
             <a:fld id="{12FE7FD0-BB34-40C4-BAE1-9991ACF139AC}" type="slidenum">
               <a:rPr lang="zh-CN" altLang="en-US" smtClean="0"/>
+              <a:t>2</a:t>
             </a:fld>
             <a:endParaRPr lang="zh-CN" altLang="en-US"/>
           </a:p>
@@ -671,6 +675,7 @@
           <a:p>
             <a:fld id="{DF4DEC76-B1CC-4BD2-B293-05E0B687F717}" type="datetimeFigureOut">
               <a:rPr lang="zh-CN" altLang="en-US" smtClean="0"/>
+              <a:t>2020/9/19</a:t>
             </a:fld>
             <a:endParaRPr lang="zh-CN" altLang="en-US"/>
           </a:p>
@@ -712,6 +717,7 @@
           <a:p>
             <a:fld id="{BB013D27-52A3-4CBA-B800-970E6E57AE67}" type="slidenum">
               <a:rPr lang="zh-CN" altLang="en-US" smtClean="0"/>
+              <a:t>‹#›</a:t>
             </a:fld>
             <a:endParaRPr lang="zh-CN" altLang="en-US"/>
           </a:p>
@@ -785,7 +791,6 @@
               <a:rPr lang="en-US" altLang="zh-CN"/>
               <a:t>Click to edit Master text styles</a:t>
             </a:r>
-            <a:endParaRPr lang="en-US" altLang="zh-CN"/>
           </a:p>
           <a:p>
             <a:pPr lvl="1"/>
@@ -793,7 +798,6 @@
               <a:rPr lang="en-US" altLang="zh-CN"/>
               <a:t>Second level</a:t>
             </a:r>
-            <a:endParaRPr lang="en-US" altLang="zh-CN"/>
           </a:p>
           <a:p>
             <a:pPr lvl="2"/>
@@ -801,7 +805,6 @@
               <a:rPr lang="en-US" altLang="zh-CN"/>
               <a:t>Third level</a:t>
             </a:r>
-            <a:endParaRPr lang="en-US" altLang="zh-CN"/>
           </a:p>
           <a:p>
             <a:pPr lvl="3"/>
@@ -809,7 +812,6 @@
               <a:rPr lang="en-US" altLang="zh-CN"/>
               <a:t>Fourth level</a:t>
             </a:r>
-            <a:endParaRPr lang="en-US" altLang="zh-CN"/>
           </a:p>
           <a:p>
             <a:pPr lvl="4"/>
@@ -838,6 +840,7 @@
           <a:p>
             <a:fld id="{DF4DEC76-B1CC-4BD2-B293-05E0B687F717}" type="datetimeFigureOut">
               <a:rPr lang="zh-CN" altLang="en-US" smtClean="0"/>
+              <a:t>2020/9/19</a:t>
             </a:fld>
             <a:endParaRPr lang="zh-CN" altLang="en-US"/>
           </a:p>
@@ -879,6 +882,7 @@
           <a:p>
             <a:fld id="{BB013D27-52A3-4CBA-B800-970E6E57AE67}" type="slidenum">
               <a:rPr lang="zh-CN" altLang="en-US" smtClean="0"/>
+              <a:t>‹#›</a:t>
             </a:fld>
             <a:endParaRPr lang="zh-CN" altLang="en-US"/>
           </a:p>
@@ -962,7 +966,6 @@
               <a:rPr lang="en-US" altLang="zh-CN"/>
               <a:t>Click to edit Master text styles</a:t>
             </a:r>
-            <a:endParaRPr lang="en-US" altLang="zh-CN"/>
           </a:p>
           <a:p>
             <a:pPr lvl="1"/>
@@ -970,7 +973,6 @@
               <a:rPr lang="en-US" altLang="zh-CN"/>
               <a:t>Second level</a:t>
             </a:r>
-            <a:endParaRPr lang="en-US" altLang="zh-CN"/>
           </a:p>
           <a:p>
             <a:pPr lvl="2"/>
@@ -978,7 +980,6 @@
               <a:rPr lang="en-US" altLang="zh-CN"/>
               <a:t>Third level</a:t>
             </a:r>
-            <a:endParaRPr lang="en-US" altLang="zh-CN"/>
           </a:p>
           <a:p>
             <a:pPr lvl="3"/>
@@ -986,7 +987,6 @@
               <a:rPr lang="en-US" altLang="zh-CN"/>
               <a:t>Fourth level</a:t>
             </a:r>
-            <a:endParaRPr lang="en-US" altLang="zh-CN"/>
           </a:p>
           <a:p>
             <a:pPr lvl="4"/>
@@ -1015,6 +1015,7 @@
           <a:p>
             <a:fld id="{DF4DEC76-B1CC-4BD2-B293-05E0B687F717}" type="datetimeFigureOut">
               <a:rPr lang="zh-CN" altLang="en-US" smtClean="0"/>
+              <a:t>2020/9/19</a:t>
             </a:fld>
             <a:endParaRPr lang="zh-CN" altLang="en-US"/>
           </a:p>
@@ -1056,6 +1057,7 @@
           <a:p>
             <a:fld id="{BB013D27-52A3-4CBA-B800-970E6E57AE67}" type="slidenum">
               <a:rPr lang="zh-CN" altLang="en-US" smtClean="0"/>
+              <a:t>‹#›</a:t>
             </a:fld>
             <a:endParaRPr lang="zh-CN" altLang="en-US"/>
           </a:p>
@@ -1129,7 +1131,6 @@
               <a:rPr lang="en-US" altLang="zh-CN"/>
               <a:t>Click to edit Master text styles</a:t>
             </a:r>
-            <a:endParaRPr lang="en-US" altLang="zh-CN"/>
           </a:p>
           <a:p>
             <a:pPr lvl="1"/>
@@ -1137,7 +1138,6 @@
               <a:rPr lang="en-US" altLang="zh-CN"/>
               <a:t>Second level</a:t>
             </a:r>
-            <a:endParaRPr lang="en-US" altLang="zh-CN"/>
           </a:p>
           <a:p>
             <a:pPr lvl="2"/>
@@ -1145,7 +1145,6 @@
               <a:rPr lang="en-US" altLang="zh-CN"/>
               <a:t>Third level</a:t>
             </a:r>
-            <a:endParaRPr lang="en-US" altLang="zh-CN"/>
           </a:p>
           <a:p>
             <a:pPr lvl="3"/>
@@ -1153,7 +1152,6 @@
               <a:rPr lang="en-US" altLang="zh-CN"/>
               <a:t>Fourth level</a:t>
             </a:r>
-            <a:endParaRPr lang="en-US" altLang="zh-CN"/>
           </a:p>
           <a:p>
             <a:pPr lvl="4"/>
@@ -1182,6 +1180,7 @@
           <a:p>
             <a:fld id="{DF4DEC76-B1CC-4BD2-B293-05E0B687F717}" type="datetimeFigureOut">
               <a:rPr lang="zh-CN" altLang="en-US" smtClean="0"/>
+              <a:t>2020/9/19</a:t>
             </a:fld>
             <a:endParaRPr lang="zh-CN" altLang="en-US"/>
           </a:p>
@@ -1223,6 +1222,7 @@
           <a:p>
             <a:fld id="{BB013D27-52A3-4CBA-B800-970E6E57AE67}" type="slidenum">
               <a:rPr lang="zh-CN" altLang="en-US" smtClean="0"/>
+              <a:t>‹#›</a:t>
             </a:fld>
             <a:endParaRPr lang="zh-CN" altLang="en-US"/>
           </a:p>
@@ -1401,7 +1401,6 @@
               <a:rPr lang="en-US" altLang="zh-CN"/>
               <a:t>Click to edit Master text styles</a:t>
             </a:r>
-            <a:endParaRPr lang="en-US" altLang="zh-CN"/>
           </a:p>
         </p:txBody>
       </p:sp>
@@ -1422,6 +1421,7 @@
           <a:p>
             <a:fld id="{DF4DEC76-B1CC-4BD2-B293-05E0B687F717}" type="datetimeFigureOut">
               <a:rPr lang="zh-CN" altLang="en-US" smtClean="0"/>
+              <a:t>2020/9/19</a:t>
             </a:fld>
             <a:endParaRPr lang="zh-CN" altLang="en-US"/>
           </a:p>
@@ -1463,6 +1463,7 @@
           <a:p>
             <a:fld id="{BB013D27-52A3-4CBA-B800-970E6E57AE67}" type="slidenum">
               <a:rPr lang="zh-CN" altLang="en-US" smtClean="0"/>
+              <a:t>‹#›</a:t>
             </a:fld>
             <a:endParaRPr lang="zh-CN" altLang="en-US"/>
           </a:p>
@@ -1541,7 +1542,6 @@
               <a:rPr lang="en-US" altLang="zh-CN"/>
               <a:t>Click to edit Master text styles</a:t>
             </a:r>
-            <a:endParaRPr lang="en-US" altLang="zh-CN"/>
           </a:p>
           <a:p>
             <a:pPr lvl="1"/>
@@ -1549,7 +1549,6 @@
               <a:rPr lang="en-US" altLang="zh-CN"/>
               <a:t>Second level</a:t>
             </a:r>
-            <a:endParaRPr lang="en-US" altLang="zh-CN"/>
           </a:p>
           <a:p>
             <a:pPr lvl="2"/>
@@ -1557,7 +1556,6 @@
               <a:rPr lang="en-US" altLang="zh-CN"/>
               <a:t>Third level</a:t>
             </a:r>
-            <a:endParaRPr lang="en-US" altLang="zh-CN"/>
           </a:p>
           <a:p>
             <a:pPr lvl="3"/>
@@ -1565,7 +1563,6 @@
               <a:rPr lang="en-US" altLang="zh-CN"/>
               <a:t>Fourth level</a:t>
             </a:r>
-            <a:endParaRPr lang="en-US" altLang="zh-CN"/>
           </a:p>
           <a:p>
             <a:pPr lvl="4"/>
@@ -1602,7 +1599,6 @@
               <a:rPr lang="en-US" altLang="zh-CN"/>
               <a:t>Click to edit Master text styles</a:t>
             </a:r>
-            <a:endParaRPr lang="en-US" altLang="zh-CN"/>
           </a:p>
           <a:p>
             <a:pPr lvl="1"/>
@@ -1610,7 +1606,6 @@
               <a:rPr lang="en-US" altLang="zh-CN"/>
               <a:t>Second level</a:t>
             </a:r>
-            <a:endParaRPr lang="en-US" altLang="zh-CN"/>
           </a:p>
           <a:p>
             <a:pPr lvl="2"/>
@@ -1618,7 +1613,6 @@
               <a:rPr lang="en-US" altLang="zh-CN"/>
               <a:t>Third level</a:t>
             </a:r>
-            <a:endParaRPr lang="en-US" altLang="zh-CN"/>
           </a:p>
           <a:p>
             <a:pPr lvl="3"/>
@@ -1626,7 +1620,6 @@
               <a:rPr lang="en-US" altLang="zh-CN"/>
               <a:t>Fourth level</a:t>
             </a:r>
-            <a:endParaRPr lang="en-US" altLang="zh-CN"/>
           </a:p>
           <a:p>
             <a:pPr lvl="4"/>
@@ -1655,6 +1648,7 @@
           <a:p>
             <a:fld id="{DF4DEC76-B1CC-4BD2-B293-05E0B687F717}" type="datetimeFigureOut">
               <a:rPr lang="zh-CN" altLang="en-US" smtClean="0"/>
+              <a:t>2020/9/19</a:t>
             </a:fld>
             <a:endParaRPr lang="zh-CN" altLang="en-US"/>
           </a:p>
@@ -1696,6 +1690,7 @@
           <a:p>
             <a:fld id="{BB013D27-52A3-4CBA-B800-970E6E57AE67}" type="slidenum">
               <a:rPr lang="zh-CN" altLang="en-US" smtClean="0"/>
+              <a:t>‹#›</a:t>
             </a:fld>
             <a:endParaRPr lang="zh-CN" altLang="en-US"/>
           </a:p>
@@ -1816,7 +1811,6 @@
               <a:rPr lang="en-US" altLang="zh-CN"/>
               <a:t>Click to edit Master text styles</a:t>
             </a:r>
-            <a:endParaRPr lang="en-US" altLang="zh-CN"/>
           </a:p>
         </p:txBody>
       </p:sp>
@@ -1845,7 +1839,6 @@
               <a:rPr lang="en-US" altLang="zh-CN"/>
               <a:t>Click to edit Master text styles</a:t>
             </a:r>
-            <a:endParaRPr lang="en-US" altLang="zh-CN"/>
           </a:p>
           <a:p>
             <a:pPr lvl="1"/>
@@ -1853,7 +1846,6 @@
               <a:rPr lang="en-US" altLang="zh-CN"/>
               <a:t>Second level</a:t>
             </a:r>
-            <a:endParaRPr lang="en-US" altLang="zh-CN"/>
           </a:p>
           <a:p>
             <a:pPr lvl="2"/>
@@ -1861,7 +1853,6 @@
               <a:rPr lang="en-US" altLang="zh-CN"/>
               <a:t>Third level</a:t>
             </a:r>
-            <a:endParaRPr lang="en-US" altLang="zh-CN"/>
           </a:p>
           <a:p>
             <a:pPr lvl="3"/>
@@ -1869,7 +1860,6 @@
               <a:rPr lang="en-US" altLang="zh-CN"/>
               <a:t>Fourth level</a:t>
             </a:r>
-            <a:endParaRPr lang="en-US" altLang="zh-CN"/>
           </a:p>
           <a:p>
             <a:pPr lvl="4"/>
@@ -1943,7 +1933,6 @@
               <a:rPr lang="en-US" altLang="zh-CN"/>
               <a:t>Click to edit Master text styles</a:t>
             </a:r>
-            <a:endParaRPr lang="en-US" altLang="zh-CN"/>
           </a:p>
         </p:txBody>
       </p:sp>
@@ -1972,7 +1961,6 @@
               <a:rPr lang="en-US" altLang="zh-CN"/>
               <a:t>Click to edit Master text styles</a:t>
             </a:r>
-            <a:endParaRPr lang="en-US" altLang="zh-CN"/>
           </a:p>
           <a:p>
             <a:pPr lvl="1"/>
@@ -1980,7 +1968,6 @@
               <a:rPr lang="en-US" altLang="zh-CN"/>
               <a:t>Second level</a:t>
             </a:r>
-            <a:endParaRPr lang="en-US" altLang="zh-CN"/>
           </a:p>
           <a:p>
             <a:pPr lvl="2"/>
@@ -1988,7 +1975,6 @@
               <a:rPr lang="en-US" altLang="zh-CN"/>
               <a:t>Third level</a:t>
             </a:r>
-            <a:endParaRPr lang="en-US" altLang="zh-CN"/>
           </a:p>
           <a:p>
             <a:pPr lvl="3"/>
@@ -1996,7 +1982,6 @@
               <a:rPr lang="en-US" altLang="zh-CN"/>
               <a:t>Fourth level</a:t>
             </a:r>
-            <a:endParaRPr lang="en-US" altLang="zh-CN"/>
           </a:p>
           <a:p>
             <a:pPr lvl="4"/>
@@ -2025,6 +2010,7 @@
           <a:p>
             <a:fld id="{DF4DEC76-B1CC-4BD2-B293-05E0B687F717}" type="datetimeFigureOut">
               <a:rPr lang="zh-CN" altLang="en-US" smtClean="0"/>
+              <a:t>2020/9/19</a:t>
             </a:fld>
             <a:endParaRPr lang="zh-CN" altLang="en-US"/>
           </a:p>
@@ -2066,6 +2052,7 @@
           <a:p>
             <a:fld id="{BB013D27-52A3-4CBA-B800-970E6E57AE67}" type="slidenum">
               <a:rPr lang="zh-CN" altLang="en-US" smtClean="0"/>
+              <a:t>‹#›</a:t>
             </a:fld>
             <a:endParaRPr lang="zh-CN" altLang="en-US"/>
           </a:p>
@@ -2136,6 +2123,7 @@
           <a:p>
             <a:fld id="{DF4DEC76-B1CC-4BD2-B293-05E0B687F717}" type="datetimeFigureOut">
               <a:rPr lang="zh-CN" altLang="en-US" smtClean="0"/>
+              <a:t>2020/9/19</a:t>
             </a:fld>
             <a:endParaRPr lang="zh-CN" altLang="en-US"/>
           </a:p>
@@ -2177,6 +2165,7 @@
           <a:p>
             <a:fld id="{BB013D27-52A3-4CBA-B800-970E6E57AE67}" type="slidenum">
               <a:rPr lang="zh-CN" altLang="en-US" smtClean="0"/>
+              <a:t>‹#›</a:t>
             </a:fld>
             <a:endParaRPr lang="zh-CN" altLang="en-US"/>
           </a:p>
@@ -2224,6 +2213,7 @@
           <a:p>
             <a:fld id="{DF4DEC76-B1CC-4BD2-B293-05E0B687F717}" type="datetimeFigureOut">
               <a:rPr lang="zh-CN" altLang="en-US" smtClean="0"/>
+              <a:t>2020/9/19</a:t>
             </a:fld>
             <a:endParaRPr lang="zh-CN" altLang="en-US"/>
           </a:p>
@@ -2265,6 +2255,7 @@
           <a:p>
             <a:fld id="{BB013D27-52A3-4CBA-B800-970E6E57AE67}" type="slidenum">
               <a:rPr lang="zh-CN" altLang="en-US" smtClean="0"/>
+              <a:t>‹#›</a:t>
             </a:fld>
             <a:endParaRPr lang="zh-CN" altLang="en-US"/>
           </a:p>
@@ -2380,7 +2371,6 @@
               <a:rPr lang="en-US" altLang="zh-CN"/>
               <a:t>Click to edit Master text styles</a:t>
             </a:r>
-            <a:endParaRPr lang="en-US" altLang="zh-CN"/>
           </a:p>
           <a:p>
             <a:pPr lvl="1"/>
@@ -2388,7 +2378,6 @@
               <a:rPr lang="en-US" altLang="zh-CN"/>
               <a:t>Second level</a:t>
             </a:r>
-            <a:endParaRPr lang="en-US" altLang="zh-CN"/>
           </a:p>
           <a:p>
             <a:pPr lvl="2"/>
@@ -2396,7 +2385,6 @@
               <a:rPr lang="en-US" altLang="zh-CN"/>
               <a:t>Third level</a:t>
             </a:r>
-            <a:endParaRPr lang="en-US" altLang="zh-CN"/>
           </a:p>
           <a:p>
             <a:pPr lvl="3"/>
@@ -2404,7 +2392,6 @@
               <a:rPr lang="en-US" altLang="zh-CN"/>
               <a:t>Fourth level</a:t>
             </a:r>
-            <a:endParaRPr lang="en-US" altLang="zh-CN"/>
           </a:p>
           <a:p>
             <a:pPr lvl="4"/>
@@ -2478,7 +2465,6 @@
               <a:rPr lang="en-US" altLang="zh-CN"/>
               <a:t>Click to edit Master text styles</a:t>
             </a:r>
-            <a:endParaRPr lang="en-US" altLang="zh-CN"/>
           </a:p>
         </p:txBody>
       </p:sp>
@@ -2499,6 +2485,7 @@
           <a:p>
             <a:fld id="{DF4DEC76-B1CC-4BD2-B293-05E0B687F717}" type="datetimeFigureOut">
               <a:rPr lang="zh-CN" altLang="en-US" smtClean="0"/>
+              <a:t>2020/9/19</a:t>
             </a:fld>
             <a:endParaRPr lang="zh-CN" altLang="en-US"/>
           </a:p>
@@ -2540,6 +2527,7 @@
           <a:p>
             <a:fld id="{BB013D27-52A3-4CBA-B800-970E6E57AE67}" type="slidenum">
               <a:rPr lang="zh-CN" altLang="en-US" smtClean="0"/>
+              <a:t>‹#›</a:t>
             </a:fld>
             <a:endParaRPr lang="zh-CN" altLang="en-US"/>
           </a:p>
@@ -2725,7 +2713,6 @@
               <a:rPr lang="en-US" altLang="zh-CN"/>
               <a:t>Click to edit Master text styles</a:t>
             </a:r>
-            <a:endParaRPr lang="en-US" altLang="zh-CN"/>
           </a:p>
         </p:txBody>
       </p:sp>
@@ -2746,6 +2733,7 @@
           <a:p>
             <a:fld id="{DF4DEC76-B1CC-4BD2-B293-05E0B687F717}" type="datetimeFigureOut">
               <a:rPr lang="zh-CN" altLang="en-US" smtClean="0"/>
+              <a:t>2020/9/19</a:t>
             </a:fld>
             <a:endParaRPr lang="zh-CN" altLang="en-US"/>
           </a:p>
@@ -2787,6 +2775,7 @@
           <a:p>
             <a:fld id="{BB013D27-52A3-4CBA-B800-970E6E57AE67}" type="slidenum">
               <a:rPr lang="zh-CN" altLang="en-US" smtClean="0"/>
+              <a:t>‹#›</a:t>
             </a:fld>
             <a:endParaRPr lang="zh-CN" altLang="en-US"/>
           </a:p>
@@ -2885,7 +2874,6 @@
               <a:rPr lang="en-US" altLang="zh-CN"/>
               <a:t>Click to edit Master text styles</a:t>
             </a:r>
-            <a:endParaRPr lang="en-US" altLang="zh-CN"/>
           </a:p>
           <a:p>
             <a:pPr lvl="1"/>
@@ -2893,7 +2881,6 @@
               <a:rPr lang="en-US" altLang="zh-CN"/>
               <a:t>Second level</a:t>
             </a:r>
-            <a:endParaRPr lang="en-US" altLang="zh-CN"/>
           </a:p>
           <a:p>
             <a:pPr lvl="2"/>
@@ -2901,7 +2888,6 @@
               <a:rPr lang="en-US" altLang="zh-CN"/>
               <a:t>Third level</a:t>
             </a:r>
-            <a:endParaRPr lang="en-US" altLang="zh-CN"/>
           </a:p>
           <a:p>
             <a:pPr lvl="3"/>
@@ -2909,7 +2895,6 @@
               <a:rPr lang="en-US" altLang="zh-CN"/>
               <a:t>Fourth level</a:t>
             </a:r>
-            <a:endParaRPr lang="en-US" altLang="zh-CN"/>
           </a:p>
           <a:p>
             <a:pPr lvl="4"/>
@@ -2956,6 +2941,7 @@
           <a:p>
             <a:fld id="{DF4DEC76-B1CC-4BD2-B293-05E0B687F717}" type="datetimeFigureOut">
               <a:rPr lang="zh-CN" altLang="en-US" smtClean="0"/>
+              <a:t>2020/9/19</a:t>
             </a:fld>
             <a:endParaRPr lang="zh-CN" altLang="en-US"/>
           </a:p>
@@ -3033,6 +3019,7 @@
           <a:p>
             <a:fld id="{BB013D27-52A3-4CBA-B800-970E6E57AE67}" type="slidenum">
               <a:rPr lang="zh-CN" altLang="en-US" smtClean="0"/>
+              <a:t>‹#›</a:t>
             </a:fld>
             <a:endParaRPr lang="zh-CN" altLang="en-US"/>
           </a:p>
@@ -3384,7 +3371,6 @@
               <a:rPr lang="en-US" altLang="zh-CN" sz="3200" dirty="0"/>
               <a:t> 1-3</a:t>
             </a:r>
-            <a:endParaRPr lang="en-US" altLang="zh-CN" sz="3200" dirty="0"/>
           </a:p>
           <a:p>
             <a:r>
@@ -4772,16 +4758,12 @@
           </a:fontRef>
         </p:style>
       </p:cxnSp>
-      <mc:AlternateContent xmlns:mc="http://schemas.openxmlformats.org/markup-compatibility/2006">
-        <mc:Choice xmlns:a14="http://schemas.microsoft.com/office/drawing/2010/main" Requires="a14">
+      <mc:AlternateContent xmlns:mc="http://schemas.openxmlformats.org/markup-compatibility/2006" xmlns:a14="http://schemas.microsoft.com/office/drawing/2010/main">
+        <mc:Choice Requires="a14">
           <p:sp>
             <p:nvSpPr>
               <p:cNvPr id="5" name="TextBox 4">
-                <a:extLst>
-                  <a:ext uri="{FF2B5EF4-FFF2-40B4-BE49-F238E27FC236}">
-                    <ele attr="{933C7B55-98EE-47D3-8E5A-D9875C0D0522}"/>
-                  </a:ext>
-                </a:extLst>
+                <a:extLst/>
               </p:cNvPr>
               <p:cNvSpPr txBox="1"/>
               <p:nvPr/>
@@ -4912,7 +4894,7 @@
             </p:txBody>
           </p:sp>
         </mc:Choice>
-        <mc:Fallback>
+        <mc:Fallback xmlns="">
           <p:sp>
             <p:nvSpPr>
               <p:cNvPr id="5" name="TextBox 4"/>
@@ -4930,7 +4912,7 @@
                 <a:avLst/>
               </a:prstGeom>
               <a:blipFill rotWithShape="1">
-                <a:blip r:embed="rId1"/>
+                <a:blip r:embed="rId3"/>
                 <a:stretch>
                   <a:fillRect/>
                 </a:stretch>
@@ -5024,16 +5006,12 @@
           </a:fontRef>
         </p:style>
       </p:cxnSp>
-      <mc:AlternateContent xmlns:mc="http://schemas.openxmlformats.org/markup-compatibility/2006">
-        <mc:Choice xmlns:a14="http://schemas.microsoft.com/office/drawing/2010/main" Requires="a14">
+      <mc:AlternateContent xmlns:mc="http://schemas.openxmlformats.org/markup-compatibility/2006" xmlns:a14="http://schemas.microsoft.com/office/drawing/2010/main">
+        <mc:Choice Requires="a14">
           <p:sp>
             <p:nvSpPr>
               <p:cNvPr id="13" name="TextBox 12">
-                <a:extLst>
-                  <a:ext uri="{FF2B5EF4-FFF2-40B4-BE49-F238E27FC236}">
-                    <ele attr="{57A5736E-06B1-4E74-996F-069A11A889A4}"/>
-                  </a:ext>
-                </a:extLst>
+                <a:extLst/>
               </p:cNvPr>
               <p:cNvSpPr txBox="1"/>
               <p:nvPr/>
@@ -5164,7 +5142,7 @@
             </p:txBody>
           </p:sp>
         </mc:Choice>
-        <mc:Fallback>
+        <mc:Fallback xmlns="">
           <p:sp>
             <p:nvSpPr>
               <p:cNvPr id="13" name="TextBox 12"/>
@@ -5182,7 +5160,7 @@
                 <a:avLst/>
               </a:prstGeom>
               <a:blipFill rotWithShape="1">
-                <a:blip r:embed="rId2"/>
+                <a:blip r:embed="rId4"/>
                 <a:stretch>
                   <a:fillRect/>
                 </a:stretch>
@@ -5206,16 +5184,12 @@
           </p:sp>
         </mc:Fallback>
       </mc:AlternateContent>
-      <mc:AlternateContent xmlns:mc="http://schemas.openxmlformats.org/markup-compatibility/2006">
-        <mc:Choice xmlns:a14="http://schemas.microsoft.com/office/drawing/2010/main" Requires="a14">
+      <mc:AlternateContent xmlns:mc="http://schemas.openxmlformats.org/markup-compatibility/2006" xmlns:a14="http://schemas.microsoft.com/office/drawing/2010/main">
+        <mc:Choice Requires="a14">
           <p:sp>
             <p:nvSpPr>
               <p:cNvPr id="14" name="TextBox 13">
-                <a:extLst>
-                  <a:ext uri="{FF2B5EF4-FFF2-40B4-BE49-F238E27FC236}">
-                    <ele attr="{563EA66D-FE1F-4602-B8E3-57BB06DD49FF}"/>
-                  </a:ext>
-                </a:extLst>
+                <a:extLst/>
               </p:cNvPr>
               <p:cNvSpPr txBox="1"/>
               <p:nvPr/>
@@ -5346,7 +5320,7 @@
             </p:txBody>
           </p:sp>
         </mc:Choice>
-        <mc:Fallback>
+        <mc:Fallback xmlns="">
           <p:sp>
             <p:nvSpPr>
               <p:cNvPr id="14" name="TextBox 13"/>
@@ -5364,7 +5338,7 @@
                 <a:avLst/>
               </a:prstGeom>
               <a:blipFill rotWithShape="1">
-                <a:blip r:embed="rId3"/>
+                <a:blip r:embed="rId5"/>
                 <a:stretch>
                   <a:fillRect/>
                 </a:stretch>
@@ -5388,16 +5362,12 @@
           </p:sp>
         </mc:Fallback>
       </mc:AlternateContent>
-      <mc:AlternateContent xmlns:mc="http://schemas.openxmlformats.org/markup-compatibility/2006">
-        <mc:Choice xmlns:a14="http://schemas.microsoft.com/office/drawing/2010/main" Requires="a14">
+      <mc:AlternateContent xmlns:mc="http://schemas.openxmlformats.org/markup-compatibility/2006" xmlns:a14="http://schemas.microsoft.com/office/drawing/2010/main">
+        <mc:Choice Requires="a14">
           <p:sp>
             <p:nvSpPr>
               <p:cNvPr id="18" name="TextBox 17">
-                <a:extLst>
-                  <a:ext uri="{FF2B5EF4-FFF2-40B4-BE49-F238E27FC236}">
-                    <ele attr="{1CAE324C-62EE-4D4F-96AC-D9DD5C420169}"/>
-                  </a:ext>
-                </a:extLst>
+                <a:extLst/>
               </p:cNvPr>
               <p:cNvSpPr txBox="1"/>
               <p:nvPr/>
@@ -5478,7 +5448,7 @@
             </p:txBody>
           </p:sp>
         </mc:Choice>
-        <mc:Fallback>
+        <mc:Fallback xmlns="">
           <p:sp>
             <p:nvSpPr>
               <p:cNvPr id="18" name="TextBox 17"/>
@@ -5496,7 +5466,7 @@
                 <a:avLst/>
               </a:prstGeom>
               <a:blipFill rotWithShape="1">
-                <a:blip r:embed="rId4"/>
+                <a:blip r:embed="rId6"/>
                 <a:stretch>
                   <a:fillRect/>
                 </a:stretch>
@@ -5520,16 +5490,12 @@
           </p:sp>
         </mc:Fallback>
       </mc:AlternateContent>
-      <mc:AlternateContent xmlns:mc="http://schemas.openxmlformats.org/markup-compatibility/2006">
-        <mc:Choice xmlns:a14="http://schemas.microsoft.com/office/drawing/2010/main" Requires="a14">
+      <mc:AlternateContent xmlns:mc="http://schemas.openxmlformats.org/markup-compatibility/2006" xmlns:a14="http://schemas.microsoft.com/office/drawing/2010/main">
+        <mc:Choice Requires="a14">
           <p:sp>
             <p:nvSpPr>
               <p:cNvPr id="19" name="TextBox 18">
-                <a:extLst>
-                  <a:ext uri="{FF2B5EF4-FFF2-40B4-BE49-F238E27FC236}">
-                    <ele attr="{2D5CA825-3757-40EC-9BE3-424B39FB5F2C}"/>
-                  </a:ext>
-                </a:extLst>
+                <a:extLst/>
               </p:cNvPr>
               <p:cNvSpPr txBox="1"/>
               <p:nvPr/>
@@ -5587,7 +5553,7 @@
             </p:txBody>
           </p:sp>
         </mc:Choice>
-        <mc:Fallback>
+        <mc:Fallback xmlns="">
           <p:sp>
             <p:nvSpPr>
               <p:cNvPr id="19" name="TextBox 18"/>
@@ -5605,7 +5571,7 @@
                 <a:avLst/>
               </a:prstGeom>
               <a:blipFill rotWithShape="1">
-                <a:blip r:embed="rId5"/>
+                <a:blip r:embed="rId7"/>
                 <a:stretch>
                   <a:fillRect/>
                 </a:stretch>
@@ -5629,16 +5595,12 @@
           </p:sp>
         </mc:Fallback>
       </mc:AlternateContent>
-      <mc:AlternateContent xmlns:mc="http://schemas.openxmlformats.org/markup-compatibility/2006">
-        <mc:Choice xmlns:a14="http://schemas.microsoft.com/office/drawing/2010/main" Requires="a14">
+      <mc:AlternateContent xmlns:mc="http://schemas.openxmlformats.org/markup-compatibility/2006" xmlns:a14="http://schemas.microsoft.com/office/drawing/2010/main">
+        <mc:Choice Requires="a14">
           <p:sp>
             <p:nvSpPr>
               <p:cNvPr id="32" name="TextBox 31">
-                <a:extLst>
-                  <a:ext uri="{FF2B5EF4-FFF2-40B4-BE49-F238E27FC236}">
-                    <ele attr="{09D602C3-4C51-4C0B-AB13-5DFD944C2362}"/>
-                  </a:ext>
-                </a:extLst>
+                <a:extLst/>
               </p:cNvPr>
               <p:cNvSpPr txBox="1"/>
               <p:nvPr/>
@@ -5696,7 +5658,7 @@
             </p:txBody>
           </p:sp>
         </mc:Choice>
-        <mc:Fallback>
+        <mc:Fallback xmlns="">
           <p:sp>
             <p:nvSpPr>
               <p:cNvPr id="32" name="TextBox 31"/>
@@ -5714,7 +5676,7 @@
                 <a:avLst/>
               </a:prstGeom>
               <a:blipFill rotWithShape="1">
-                <a:blip r:embed="rId6"/>
+                <a:blip r:embed="rId8"/>
                 <a:stretch>
                   <a:fillRect/>
                 </a:stretch>
@@ -5738,16 +5700,12 @@
           </p:sp>
         </mc:Fallback>
       </mc:AlternateContent>
-      <mc:AlternateContent xmlns:mc="http://schemas.openxmlformats.org/markup-compatibility/2006">
-        <mc:Choice xmlns:a14="http://schemas.microsoft.com/office/drawing/2010/main" Requires="a14">
+      <mc:AlternateContent xmlns:mc="http://schemas.openxmlformats.org/markup-compatibility/2006" xmlns:a14="http://schemas.microsoft.com/office/drawing/2010/main">
+        <mc:Choice Requires="a14">
           <p:sp>
             <p:nvSpPr>
               <p:cNvPr id="39" name="TextBox 38">
-                <a:extLst>
-                  <a:ext uri="{FF2B5EF4-FFF2-40B4-BE49-F238E27FC236}">
-                    <ele attr="{756C0336-7BD7-42E9-B1D0-28EA30C9F5B1}"/>
-                  </a:ext>
-                </a:extLst>
+                <a:extLst/>
               </p:cNvPr>
               <p:cNvSpPr txBox="1"/>
               <p:nvPr/>
@@ -5796,7 +5754,7 @@
             </p:txBody>
           </p:sp>
         </mc:Choice>
-        <mc:Fallback>
+        <mc:Fallback xmlns="">
           <p:sp>
             <p:nvSpPr>
               <p:cNvPr id="39" name="TextBox 38"/>
@@ -5814,7 +5772,7 @@
                 <a:avLst/>
               </a:prstGeom>
               <a:blipFill rotWithShape="1">
-                <a:blip r:embed="rId7"/>
+                <a:blip r:embed="rId9"/>
                 <a:stretch>
                   <a:fillRect/>
                 </a:stretch>
@@ -5838,16 +5796,12 @@
           </p:sp>
         </mc:Fallback>
       </mc:AlternateContent>
-      <mc:AlternateContent xmlns:mc="http://schemas.openxmlformats.org/markup-compatibility/2006">
-        <mc:Choice xmlns:a14="http://schemas.microsoft.com/office/drawing/2010/main" Requires="a14">
+      <mc:AlternateContent xmlns:mc="http://schemas.openxmlformats.org/markup-compatibility/2006" xmlns:a14="http://schemas.microsoft.com/office/drawing/2010/main">
+        <mc:Choice Requires="a14">
           <p:sp>
             <p:nvSpPr>
               <p:cNvPr id="41" name="TextBox 40">
-                <a:extLst>
-                  <a:ext uri="{FF2B5EF4-FFF2-40B4-BE49-F238E27FC236}">
-                    <ele attr="{FCDD121C-60FB-4D33-B197-E9A5AA5B628F}"/>
-                  </a:ext>
-                </a:extLst>
+                <a:extLst/>
               </p:cNvPr>
               <p:cNvSpPr txBox="1"/>
               <p:nvPr/>
@@ -5896,7 +5850,7 @@
             </p:txBody>
           </p:sp>
         </mc:Choice>
-        <mc:Fallback>
+        <mc:Fallback xmlns="">
           <p:sp>
             <p:nvSpPr>
               <p:cNvPr id="41" name="TextBox 40"/>
@@ -5914,7 +5868,7 @@
                 <a:avLst/>
               </a:prstGeom>
               <a:blipFill rotWithShape="1">
-                <a:blip r:embed="rId8"/>
+                <a:blip r:embed="rId10"/>
                 <a:stretch>
                   <a:fillRect/>
                 </a:stretch>
@@ -6054,16 +6008,12 @@
           </a:fontRef>
         </p:style>
       </p:cxnSp>
-      <mc:AlternateContent xmlns:mc="http://schemas.openxmlformats.org/markup-compatibility/2006">
-        <mc:Choice xmlns:a14="http://schemas.microsoft.com/office/drawing/2010/main" Requires="a14">
+      <mc:AlternateContent xmlns:mc="http://schemas.openxmlformats.org/markup-compatibility/2006" xmlns:a14="http://schemas.microsoft.com/office/drawing/2010/main">
+        <mc:Choice Requires="a14">
           <p:sp>
             <p:nvSpPr>
               <p:cNvPr id="45" name="TextBox 44">
-                <a:extLst>
-                  <a:ext uri="{FF2B5EF4-FFF2-40B4-BE49-F238E27FC236}">
-                    <ele attr="{EA73357A-2EF5-4021-B47C-CF31635EACD3}"/>
-                  </a:ext>
-                </a:extLst>
+                <a:extLst/>
               </p:cNvPr>
               <p:cNvSpPr txBox="1"/>
               <p:nvPr/>
@@ -6194,7 +6144,7 @@
             </p:txBody>
           </p:sp>
         </mc:Choice>
-        <mc:Fallback>
+        <mc:Fallback xmlns="">
           <p:sp>
             <p:nvSpPr>
               <p:cNvPr id="45" name="TextBox 44"/>
@@ -6212,7 +6162,7 @@
                 <a:avLst/>
               </a:prstGeom>
               <a:blipFill rotWithShape="1">
-                <a:blip r:embed="rId9"/>
+                <a:blip r:embed="rId11"/>
                 <a:stretch>
                   <a:fillRect/>
                 </a:stretch>
@@ -6306,16 +6256,12 @@
           </a:fontRef>
         </p:style>
       </p:cxnSp>
-      <mc:AlternateContent xmlns:mc="http://schemas.openxmlformats.org/markup-compatibility/2006">
-        <mc:Choice xmlns:a14="http://schemas.microsoft.com/office/drawing/2010/main" Requires="a14">
+      <mc:AlternateContent xmlns:mc="http://schemas.openxmlformats.org/markup-compatibility/2006" xmlns:a14="http://schemas.microsoft.com/office/drawing/2010/main">
+        <mc:Choice Requires="a14">
           <p:sp>
             <p:nvSpPr>
               <p:cNvPr id="48" name="TextBox 47">
-                <a:extLst>
-                  <a:ext uri="{FF2B5EF4-FFF2-40B4-BE49-F238E27FC236}">
-                    <ele attr="{5BC3F56C-FF6A-49B5-ACF8-5DCC0BDA3E0A}"/>
-                  </a:ext>
-                </a:extLst>
+                <a:extLst/>
               </p:cNvPr>
               <p:cNvSpPr txBox="1"/>
               <p:nvPr/>
@@ -6446,7 +6392,7 @@
             </p:txBody>
           </p:sp>
         </mc:Choice>
-        <mc:Fallback>
+        <mc:Fallback xmlns="">
           <p:sp>
             <p:nvSpPr>
               <p:cNvPr id="48" name="TextBox 47"/>
@@ -6464,7 +6410,7 @@
                 <a:avLst/>
               </a:prstGeom>
               <a:blipFill rotWithShape="1">
-                <a:blip r:embed="rId10"/>
+                <a:blip r:embed="rId12"/>
                 <a:stretch>
                   <a:fillRect/>
                 </a:stretch>
@@ -6488,16 +6434,12 @@
           </p:sp>
         </mc:Fallback>
       </mc:AlternateContent>
-      <mc:AlternateContent xmlns:mc="http://schemas.openxmlformats.org/markup-compatibility/2006">
-        <mc:Choice xmlns:a14="http://schemas.microsoft.com/office/drawing/2010/main" Requires="a14">
+      <mc:AlternateContent xmlns:mc="http://schemas.openxmlformats.org/markup-compatibility/2006" xmlns:a14="http://schemas.microsoft.com/office/drawing/2010/main">
+        <mc:Choice Requires="a14">
           <p:sp>
             <p:nvSpPr>
               <p:cNvPr id="49" name="TextBox 48">
-                <a:extLst>
-                  <a:ext uri="{FF2B5EF4-FFF2-40B4-BE49-F238E27FC236}">
-                    <ele attr="{B37A9BFC-2DB7-4B9B-9AD9-F860C45C4AFC}"/>
-                  </a:ext>
-                </a:extLst>
+                <a:extLst/>
               </p:cNvPr>
               <p:cNvSpPr txBox="1"/>
               <p:nvPr/>
@@ -6628,7 +6570,7 @@
             </p:txBody>
           </p:sp>
         </mc:Choice>
-        <mc:Fallback>
+        <mc:Fallback xmlns="">
           <p:sp>
             <p:nvSpPr>
               <p:cNvPr id="49" name="TextBox 48"/>
@@ -6646,7 +6588,7 @@
                 <a:avLst/>
               </a:prstGeom>
               <a:blipFill rotWithShape="1">
-                <a:blip r:embed="rId11"/>
+                <a:blip r:embed="rId13"/>
                 <a:stretch>
                   <a:fillRect/>
                 </a:stretch>
@@ -6670,16 +6612,12 @@
           </p:sp>
         </mc:Fallback>
       </mc:AlternateContent>
-      <mc:AlternateContent xmlns:mc="http://schemas.openxmlformats.org/markup-compatibility/2006">
-        <mc:Choice xmlns:a14="http://schemas.microsoft.com/office/drawing/2010/main" Requires="a14">
+      <mc:AlternateContent xmlns:mc="http://schemas.openxmlformats.org/markup-compatibility/2006" xmlns:a14="http://schemas.microsoft.com/office/drawing/2010/main">
+        <mc:Choice Requires="a14">
           <p:sp>
             <p:nvSpPr>
               <p:cNvPr id="50" name="TextBox 49">
-                <a:extLst>
-                  <a:ext uri="{FF2B5EF4-FFF2-40B4-BE49-F238E27FC236}">
-                    <ele attr="{44250EB2-F9D1-4365-9EFF-CBF4121FCED8}"/>
-                  </a:ext>
-                </a:extLst>
+                <a:extLst/>
               </p:cNvPr>
               <p:cNvSpPr txBox="1"/>
               <p:nvPr/>
@@ -6760,7 +6698,7 @@
             </p:txBody>
           </p:sp>
         </mc:Choice>
-        <mc:Fallback>
+        <mc:Fallback xmlns="">
           <p:sp>
             <p:nvSpPr>
               <p:cNvPr id="50" name="TextBox 49"/>
@@ -6778,7 +6716,7 @@
                 <a:avLst/>
               </a:prstGeom>
               <a:blipFill rotWithShape="1">
-                <a:blip r:embed="rId12"/>
+                <a:blip r:embed="rId14"/>
                 <a:stretch>
                   <a:fillRect/>
                 </a:stretch>
@@ -6802,16 +6740,12 @@
           </p:sp>
         </mc:Fallback>
       </mc:AlternateContent>
-      <mc:AlternateContent xmlns:mc="http://schemas.openxmlformats.org/markup-compatibility/2006">
-        <mc:Choice xmlns:a14="http://schemas.microsoft.com/office/drawing/2010/main" Requires="a14">
+      <mc:AlternateContent xmlns:mc="http://schemas.openxmlformats.org/markup-compatibility/2006" xmlns:a14="http://schemas.microsoft.com/office/drawing/2010/main">
+        <mc:Choice Requires="a14">
           <p:sp>
             <p:nvSpPr>
               <p:cNvPr id="51" name="TextBox 50">
-                <a:extLst>
-                  <a:ext uri="{FF2B5EF4-FFF2-40B4-BE49-F238E27FC236}">
-                    <ele attr="{ED7A0522-1469-4CFE-ACE5-4234F6C09229}"/>
-                  </a:ext>
-                </a:extLst>
+                <a:extLst/>
               </p:cNvPr>
               <p:cNvSpPr txBox="1"/>
               <p:nvPr/>
@@ -6869,7 +6803,7 @@
             </p:txBody>
           </p:sp>
         </mc:Choice>
-        <mc:Fallback>
+        <mc:Fallback xmlns="">
           <p:sp>
             <p:nvSpPr>
               <p:cNvPr id="51" name="TextBox 50"/>
@@ -6887,7 +6821,7 @@
                 <a:avLst/>
               </a:prstGeom>
               <a:blipFill rotWithShape="1">
-                <a:blip r:embed="rId13"/>
+                <a:blip r:embed="rId15"/>
                 <a:stretch>
                   <a:fillRect/>
                 </a:stretch>
@@ -6911,16 +6845,12 @@
           </p:sp>
         </mc:Fallback>
       </mc:AlternateContent>
-      <mc:AlternateContent xmlns:mc="http://schemas.openxmlformats.org/markup-compatibility/2006">
-        <mc:Choice xmlns:a14="http://schemas.microsoft.com/office/drawing/2010/main" Requires="a14">
+      <mc:AlternateContent xmlns:mc="http://schemas.openxmlformats.org/markup-compatibility/2006" xmlns:a14="http://schemas.microsoft.com/office/drawing/2010/main">
+        <mc:Choice Requires="a14">
           <p:sp>
             <p:nvSpPr>
               <p:cNvPr id="52" name="TextBox 51">
-                <a:extLst>
-                  <a:ext uri="{FF2B5EF4-FFF2-40B4-BE49-F238E27FC236}">
-                    <ele attr="{66489013-9938-493F-B615-C60514FBEE46}"/>
-                  </a:ext>
-                </a:extLst>
+                <a:extLst/>
               </p:cNvPr>
               <p:cNvSpPr txBox="1"/>
               <p:nvPr/>
@@ -6978,7 +6908,7 @@
             </p:txBody>
           </p:sp>
         </mc:Choice>
-        <mc:Fallback>
+        <mc:Fallback xmlns="">
           <p:sp>
             <p:nvSpPr>
               <p:cNvPr id="52" name="TextBox 51"/>
@@ -6996,7 +6926,7 @@
                 <a:avLst/>
               </a:prstGeom>
               <a:blipFill rotWithShape="1">
-                <a:blip r:embed="rId14"/>
+                <a:blip r:embed="rId16"/>
                 <a:stretch>
                   <a:fillRect/>
                 </a:stretch>
@@ -7020,16 +6950,12 @@
           </p:sp>
         </mc:Fallback>
       </mc:AlternateContent>
-      <mc:AlternateContent xmlns:mc="http://schemas.openxmlformats.org/markup-compatibility/2006">
-        <mc:Choice xmlns:a14="http://schemas.microsoft.com/office/drawing/2010/main" Requires="a14">
+      <mc:AlternateContent xmlns:mc="http://schemas.openxmlformats.org/markup-compatibility/2006" xmlns:a14="http://schemas.microsoft.com/office/drawing/2010/main">
+        <mc:Choice Requires="a14">
           <p:sp>
             <p:nvSpPr>
               <p:cNvPr id="53" name="TextBox 52">
-                <a:extLst>
-                  <a:ext uri="{FF2B5EF4-FFF2-40B4-BE49-F238E27FC236}">
-                    <ele attr="{071483CC-0C51-47B3-B643-0D9A7A30E9AF}"/>
-                  </a:ext>
-                </a:extLst>
+                <a:extLst/>
               </p:cNvPr>
               <p:cNvSpPr txBox="1"/>
               <p:nvPr/>
@@ -7078,7 +7004,7 @@
             </p:txBody>
           </p:sp>
         </mc:Choice>
-        <mc:Fallback>
+        <mc:Fallback xmlns="">
           <p:sp>
             <p:nvSpPr>
               <p:cNvPr id="53" name="TextBox 52"/>
@@ -7096,7 +7022,7 @@
                 <a:avLst/>
               </a:prstGeom>
               <a:blipFill rotWithShape="1">
-                <a:blip r:embed="rId15"/>
+                <a:blip r:embed="rId17"/>
                 <a:stretch>
                   <a:fillRect/>
                 </a:stretch>
@@ -7120,16 +7046,12 @@
           </p:sp>
         </mc:Fallback>
       </mc:AlternateContent>
-      <mc:AlternateContent xmlns:mc="http://schemas.openxmlformats.org/markup-compatibility/2006">
-        <mc:Choice xmlns:a14="http://schemas.microsoft.com/office/drawing/2010/main" Requires="a14">
+      <mc:AlternateContent xmlns:mc="http://schemas.openxmlformats.org/markup-compatibility/2006" xmlns:a14="http://schemas.microsoft.com/office/drawing/2010/main">
+        <mc:Choice Requires="a14">
           <p:sp>
             <p:nvSpPr>
               <p:cNvPr id="54" name="TextBox 53">
-                <a:extLst>
-                  <a:ext uri="{FF2B5EF4-FFF2-40B4-BE49-F238E27FC236}">
-                    <ele attr="{B0439D01-1443-4BEF-9214-FF8A060FB68D}"/>
-                  </a:ext>
-                </a:extLst>
+                <a:extLst/>
               </p:cNvPr>
               <p:cNvSpPr txBox="1"/>
               <p:nvPr/>
@@ -7178,7 +7100,7 @@
             </p:txBody>
           </p:sp>
         </mc:Choice>
-        <mc:Fallback>
+        <mc:Fallback xmlns="">
           <p:sp>
             <p:nvSpPr>
               <p:cNvPr id="54" name="TextBox 53"/>
@@ -7196,7 +7118,7 @@
                 <a:avLst/>
               </a:prstGeom>
               <a:blipFill rotWithShape="1">
-                <a:blip r:embed="rId16"/>
+                <a:blip r:embed="rId18"/>
                 <a:stretch>
                   <a:fillRect/>
                 </a:stretch>
@@ -8195,16 +8117,12 @@
           </a:p>
         </p:txBody>
       </p:sp>
-      <mc:AlternateContent xmlns:mc="http://schemas.openxmlformats.org/markup-compatibility/2006">
-        <mc:Choice xmlns:a14="http://schemas.microsoft.com/office/drawing/2010/main" Requires="a14">
+      <mc:AlternateContent xmlns:mc="http://schemas.openxmlformats.org/markup-compatibility/2006" xmlns:a14="http://schemas.microsoft.com/office/drawing/2010/main">
+        <mc:Choice Requires="a14">
           <p:sp>
             <p:nvSpPr>
               <p:cNvPr id="2" name="TextBox 1">
-                <a:extLst>
-                  <a:ext uri="{FF2B5EF4-FFF2-40B4-BE49-F238E27FC236}">
-                    <ele attr="{1E5FF24D-7BC8-4B50-A9E7-1BAB3EB7A364}"/>
-                  </a:ext>
-                </a:extLst>
+                <a:extLst/>
               </p:cNvPr>
               <p:cNvSpPr txBox="1"/>
               <p:nvPr/>
@@ -8335,7 +8253,7 @@
             </p:txBody>
           </p:sp>
         </mc:Choice>
-        <mc:Fallback>
+        <mc:Fallback xmlns="">
           <p:sp>
             <p:nvSpPr>
               <p:cNvPr id="2" name="TextBox 1"/>
@@ -8353,7 +8271,7 @@
                 <a:avLst/>
               </a:prstGeom>
               <a:blipFill rotWithShape="1">
-                <a:blip r:embed="rId1"/>
+                <a:blip r:embed="rId2"/>
                 <a:stretch>
                   <a:fillRect b="-23529"/>
                 </a:stretch>
@@ -8479,16 +8397,12 @@
           </a:p>
         </p:txBody>
       </p:sp>
-      <mc:AlternateContent xmlns:mc="http://schemas.openxmlformats.org/markup-compatibility/2006">
-        <mc:Choice xmlns:a14="http://schemas.microsoft.com/office/drawing/2010/main" Requires="a14">
+      <mc:AlternateContent xmlns:mc="http://schemas.openxmlformats.org/markup-compatibility/2006" xmlns:a14="http://schemas.microsoft.com/office/drawing/2010/main">
+        <mc:Choice Requires="a14">
           <p:sp>
             <p:nvSpPr>
               <p:cNvPr id="9" name="TextBox 8">
-                <a:extLst>
-                  <a:ext uri="{FF2B5EF4-FFF2-40B4-BE49-F238E27FC236}">
-                    <ele attr="{3E1B4DFB-D459-4381-904B-95BF8E4C926C}"/>
-                  </a:ext>
-                </a:extLst>
+                <a:extLst/>
               </p:cNvPr>
               <p:cNvSpPr txBox="1"/>
               <p:nvPr/>
@@ -8619,7 +8533,7 @@
             </p:txBody>
           </p:sp>
         </mc:Choice>
-        <mc:Fallback>
+        <mc:Fallback xmlns="">
           <p:sp>
             <p:nvSpPr>
               <p:cNvPr id="9" name="TextBox 8"/>
@@ -8637,7 +8551,7 @@
                 <a:avLst/>
               </a:prstGeom>
               <a:blipFill rotWithShape="1">
-                <a:blip r:embed="rId2"/>
+                <a:blip r:embed="rId3"/>
                 <a:stretch>
                   <a:fillRect b="-23529"/>
                 </a:stretch>
@@ -8661,16 +8575,12 @@
           </p:sp>
         </mc:Fallback>
       </mc:AlternateContent>
-      <mc:AlternateContent xmlns:mc="http://schemas.openxmlformats.org/markup-compatibility/2006">
-        <mc:Choice xmlns:a14="http://schemas.microsoft.com/office/drawing/2010/main" Requires="a14">
+      <mc:AlternateContent xmlns:mc="http://schemas.openxmlformats.org/markup-compatibility/2006" xmlns:a14="http://schemas.microsoft.com/office/drawing/2010/main">
+        <mc:Choice Requires="a14">
           <p:sp>
             <p:nvSpPr>
               <p:cNvPr id="10" name="TextBox 9">
-                <a:extLst>
-                  <a:ext uri="{FF2B5EF4-FFF2-40B4-BE49-F238E27FC236}">
-                    <ele attr="{2B01E312-BC78-44B9-84EE-6ACE6470E094}"/>
-                  </a:ext>
-                </a:extLst>
+                <a:extLst/>
               </p:cNvPr>
               <p:cNvSpPr txBox="1"/>
               <p:nvPr/>
@@ -8801,7 +8711,7 @@
             </p:txBody>
           </p:sp>
         </mc:Choice>
-        <mc:Fallback>
+        <mc:Fallback xmlns="">
           <p:sp>
             <p:nvSpPr>
               <p:cNvPr id="10" name="TextBox 9"/>
@@ -8819,7 +8729,7 @@
                 <a:avLst/>
               </a:prstGeom>
               <a:blipFill rotWithShape="1">
-                <a:blip r:embed="rId3"/>
+                <a:blip r:embed="rId4"/>
                 <a:stretch>
                   <a:fillRect b="-23529"/>
                 </a:stretch>
@@ -8843,16 +8753,12 @@
           </p:sp>
         </mc:Fallback>
       </mc:AlternateContent>
-      <mc:AlternateContent xmlns:mc="http://schemas.openxmlformats.org/markup-compatibility/2006">
-        <mc:Choice xmlns:a14="http://schemas.microsoft.com/office/drawing/2010/main" Requires="a14">
+      <mc:AlternateContent xmlns:mc="http://schemas.openxmlformats.org/markup-compatibility/2006" xmlns:a14="http://schemas.microsoft.com/office/drawing/2010/main">
+        <mc:Choice Requires="a14">
           <p:sp>
             <p:nvSpPr>
               <p:cNvPr id="12" name="TextBox 11">
-                <a:extLst>
-                  <a:ext uri="{FF2B5EF4-FFF2-40B4-BE49-F238E27FC236}">
-                    <ele attr="{DB54663D-682A-45CB-A313-9F96D6846F26}"/>
-                  </a:ext>
-                </a:extLst>
+                <a:extLst/>
               </p:cNvPr>
               <p:cNvSpPr txBox="1"/>
               <p:nvPr/>
@@ -8983,7 +8889,7 @@
             </p:txBody>
           </p:sp>
         </mc:Choice>
-        <mc:Fallback>
+        <mc:Fallback xmlns="">
           <p:sp>
             <p:nvSpPr>
               <p:cNvPr id="12" name="TextBox 11"/>
@@ -9001,7 +8907,7 @@
                 <a:avLst/>
               </a:prstGeom>
               <a:blipFill rotWithShape="1">
-                <a:blip r:embed="rId4"/>
+                <a:blip r:embed="rId5"/>
                 <a:stretch>
                   <a:fillRect b="-26000"/>
                 </a:stretch>
@@ -9025,16 +8931,12 @@
           </p:sp>
         </mc:Fallback>
       </mc:AlternateContent>
-      <mc:AlternateContent xmlns:mc="http://schemas.openxmlformats.org/markup-compatibility/2006">
-        <mc:Choice xmlns:a14="http://schemas.microsoft.com/office/drawing/2010/main" Requires="a14">
+      <mc:AlternateContent xmlns:mc="http://schemas.openxmlformats.org/markup-compatibility/2006" xmlns:a14="http://schemas.microsoft.com/office/drawing/2010/main">
+        <mc:Choice Requires="a14">
           <p:sp>
             <p:nvSpPr>
               <p:cNvPr id="13" name="TextBox 12">
-                <a:extLst>
-                  <a:ext uri="{FF2B5EF4-FFF2-40B4-BE49-F238E27FC236}">
-                    <ele attr="{AD7CBD4D-9CAA-4DBB-B429-8A9535C10B89}"/>
-                  </a:ext>
-                </a:extLst>
+                <a:extLst/>
               </p:cNvPr>
               <p:cNvSpPr txBox="1"/>
               <p:nvPr/>
@@ -9115,7 +9017,7 @@
             </p:txBody>
           </p:sp>
         </mc:Choice>
-        <mc:Fallback>
+        <mc:Fallback xmlns="">
           <p:sp>
             <p:nvSpPr>
               <p:cNvPr id="13" name="TextBox 12"/>
@@ -9133,7 +9035,7 @@
                 <a:avLst/>
               </a:prstGeom>
               <a:blipFill rotWithShape="1">
-                <a:blip r:embed="rId5"/>
+                <a:blip r:embed="rId6"/>
                 <a:stretch>
                   <a:fillRect b="-6000"/>
                 </a:stretch>
@@ -9157,16 +9059,12 @@
           </p:sp>
         </mc:Fallback>
       </mc:AlternateContent>
-      <mc:AlternateContent xmlns:mc="http://schemas.openxmlformats.org/markup-compatibility/2006">
-        <mc:Choice xmlns:a14="http://schemas.microsoft.com/office/drawing/2010/main" Requires="a14">
+      <mc:AlternateContent xmlns:mc="http://schemas.openxmlformats.org/markup-compatibility/2006" xmlns:a14="http://schemas.microsoft.com/office/drawing/2010/main">
+        <mc:Choice Requires="a14">
           <p:sp>
             <p:nvSpPr>
               <p:cNvPr id="14" name="TextBox 13">
-                <a:extLst>
-                  <a:ext uri="{FF2B5EF4-FFF2-40B4-BE49-F238E27FC236}">
-                    <ele attr="{5E6A40A4-891F-4277-AA11-51C86D5FCF32}"/>
-                  </a:ext>
-                </a:extLst>
+                <a:extLst/>
               </p:cNvPr>
               <p:cNvSpPr txBox="1"/>
               <p:nvPr/>
@@ -9247,7 +9145,7 @@
             </p:txBody>
           </p:sp>
         </mc:Choice>
-        <mc:Fallback>
+        <mc:Fallback xmlns="">
           <p:sp>
             <p:nvSpPr>
               <p:cNvPr id="14" name="TextBox 13"/>
@@ -9265,7 +9163,7 @@
                 <a:avLst/>
               </a:prstGeom>
               <a:blipFill rotWithShape="1">
-                <a:blip r:embed="rId6"/>
+                <a:blip r:embed="rId7"/>
                 <a:stretch>
                   <a:fillRect b="-5882"/>
                 </a:stretch>
@@ -9289,16 +9187,12 @@
           </p:sp>
         </mc:Fallback>
       </mc:AlternateContent>
-      <mc:AlternateContent xmlns:mc="http://schemas.openxmlformats.org/markup-compatibility/2006">
-        <mc:Choice xmlns:a14="http://schemas.microsoft.com/office/drawing/2010/main" Requires="a14">
+      <mc:AlternateContent xmlns:mc="http://schemas.openxmlformats.org/markup-compatibility/2006" xmlns:a14="http://schemas.microsoft.com/office/drawing/2010/main">
+        <mc:Choice Requires="a14">
           <p:sp>
             <p:nvSpPr>
               <p:cNvPr id="16" name="TextBox 15">
-                <a:extLst>
-                  <a:ext uri="{FF2B5EF4-FFF2-40B4-BE49-F238E27FC236}">
-                    <ele attr="{F5384A60-4F56-4F2A-876B-01642D6D212B}"/>
-                  </a:ext>
-                </a:extLst>
+                <a:extLst/>
               </p:cNvPr>
               <p:cNvSpPr txBox="1"/>
               <p:nvPr/>
@@ -9379,7 +9273,7 @@
             </p:txBody>
           </p:sp>
         </mc:Choice>
-        <mc:Fallback>
+        <mc:Fallback xmlns="">
           <p:sp>
             <p:nvSpPr>
               <p:cNvPr id="16" name="TextBox 15"/>
@@ -9397,7 +9291,7 @@
                 <a:avLst/>
               </a:prstGeom>
               <a:blipFill rotWithShape="1">
-                <a:blip r:embed="rId7"/>
+                <a:blip r:embed="rId8"/>
                 <a:stretch>
                   <a:fillRect b="-5882"/>
                 </a:stretch>
@@ -9421,16 +9315,12 @@
           </p:sp>
         </mc:Fallback>
       </mc:AlternateContent>
-      <mc:AlternateContent xmlns:mc="http://schemas.openxmlformats.org/markup-compatibility/2006">
-        <mc:Choice xmlns:a14="http://schemas.microsoft.com/office/drawing/2010/main" Requires="a14">
+      <mc:AlternateContent xmlns:mc="http://schemas.openxmlformats.org/markup-compatibility/2006" xmlns:a14="http://schemas.microsoft.com/office/drawing/2010/main">
+        <mc:Choice Requires="a14">
           <p:sp>
             <p:nvSpPr>
               <p:cNvPr id="17" name="TextBox 16">
-                <a:extLst>
-                  <a:ext uri="{FF2B5EF4-FFF2-40B4-BE49-F238E27FC236}">
-                    <ele attr="{C4A83384-7995-444B-98A6-DB381DC8ABDC}"/>
-                  </a:ext>
-                </a:extLst>
+                <a:extLst/>
               </p:cNvPr>
               <p:cNvSpPr txBox="1"/>
               <p:nvPr/>
@@ -9511,7 +9401,7 @@
             </p:txBody>
           </p:sp>
         </mc:Choice>
-        <mc:Fallback>
+        <mc:Fallback xmlns="">
           <p:sp>
             <p:nvSpPr>
               <p:cNvPr id="17" name="TextBox 16"/>
@@ -9529,7 +9419,7 @@
                 <a:avLst/>
               </a:prstGeom>
               <a:blipFill rotWithShape="1">
-                <a:blip r:embed="rId8"/>
+                <a:blip r:embed="rId9"/>
                 <a:stretch>
                   <a:fillRect b="-5882"/>
                 </a:stretch>
@@ -9553,16 +9443,12 @@
           </p:sp>
         </mc:Fallback>
       </mc:AlternateContent>
-      <mc:AlternateContent xmlns:mc="http://schemas.openxmlformats.org/markup-compatibility/2006">
-        <mc:Choice xmlns:a14="http://schemas.microsoft.com/office/drawing/2010/main" Requires="a14">
+      <mc:AlternateContent xmlns:mc="http://schemas.openxmlformats.org/markup-compatibility/2006" xmlns:a14="http://schemas.microsoft.com/office/drawing/2010/main">
+        <mc:Choice Requires="a14">
           <p:sp>
             <p:nvSpPr>
               <p:cNvPr id="19" name="TextBox 18">
-                <a:extLst>
-                  <a:ext uri="{FF2B5EF4-FFF2-40B4-BE49-F238E27FC236}">
-                    <ele attr="{0BEB8DC5-CFD9-45DD-8910-61F7A90FCF62}"/>
-                  </a:ext>
-                </a:extLst>
+                <a:extLst/>
               </p:cNvPr>
               <p:cNvSpPr txBox="1"/>
               <p:nvPr/>
@@ -9693,7 +9579,7 @@
             </p:txBody>
           </p:sp>
         </mc:Choice>
-        <mc:Fallback>
+        <mc:Fallback xmlns="">
           <p:sp>
             <p:nvSpPr>
               <p:cNvPr id="19" name="TextBox 18"/>
@@ -9711,7 +9597,7 @@
                 <a:avLst/>
               </a:prstGeom>
               <a:blipFill rotWithShape="1">
-                <a:blip r:embed="rId9"/>
+                <a:blip r:embed="rId10"/>
                 <a:stretch>
                   <a:fillRect b="-26000"/>
                 </a:stretch>
@@ -9735,16 +9621,12 @@
           </p:sp>
         </mc:Fallback>
       </mc:AlternateContent>
-      <mc:AlternateContent xmlns:mc="http://schemas.openxmlformats.org/markup-compatibility/2006">
-        <mc:Choice xmlns:a14="http://schemas.microsoft.com/office/drawing/2010/main" Requires="a14">
+      <mc:AlternateContent xmlns:mc="http://schemas.openxmlformats.org/markup-compatibility/2006" xmlns:a14="http://schemas.microsoft.com/office/drawing/2010/main">
+        <mc:Choice Requires="a14">
           <p:sp>
             <p:nvSpPr>
               <p:cNvPr id="21" name="TextBox 20">
-                <a:extLst>
-                  <a:ext uri="{FF2B5EF4-FFF2-40B4-BE49-F238E27FC236}">
-                    <ele attr="{A8988DB3-E902-4AA8-9171-C4FCFF5DA838}"/>
-                  </a:ext>
-                </a:extLst>
+                <a:extLst/>
               </p:cNvPr>
               <p:cNvSpPr txBox="1"/>
               <p:nvPr/>
@@ -9875,7 +9757,7 @@
             </p:txBody>
           </p:sp>
         </mc:Choice>
-        <mc:Fallback>
+        <mc:Fallback xmlns="">
           <p:sp>
             <p:nvSpPr>
               <p:cNvPr id="21" name="TextBox 20"/>
@@ -9893,7 +9775,7 @@
                 <a:avLst/>
               </a:prstGeom>
               <a:blipFill rotWithShape="1">
-                <a:blip r:embed="rId10"/>
+                <a:blip r:embed="rId11"/>
                 <a:stretch>
                   <a:fillRect b="-26000"/>
                 </a:stretch>
@@ -9917,16 +9799,12 @@
           </p:sp>
         </mc:Fallback>
       </mc:AlternateContent>
-      <mc:AlternateContent xmlns:mc="http://schemas.openxmlformats.org/markup-compatibility/2006">
-        <mc:Choice xmlns:a14="http://schemas.microsoft.com/office/drawing/2010/main" Requires="a14">
+      <mc:AlternateContent xmlns:mc="http://schemas.openxmlformats.org/markup-compatibility/2006" xmlns:a14="http://schemas.microsoft.com/office/drawing/2010/main">
+        <mc:Choice Requires="a14">
           <p:sp>
             <p:nvSpPr>
               <p:cNvPr id="22" name="TextBox 21">
-                <a:extLst>
-                  <a:ext uri="{FF2B5EF4-FFF2-40B4-BE49-F238E27FC236}">
-                    <ele attr="{EB9F9D9D-72A0-4FAD-AD99-65BD0A8CC06E}"/>
-                  </a:ext>
-                </a:extLst>
+                <a:extLst/>
               </p:cNvPr>
               <p:cNvSpPr txBox="1"/>
               <p:nvPr/>
@@ -10057,7 +9935,7 @@
             </p:txBody>
           </p:sp>
         </mc:Choice>
-        <mc:Fallback>
+        <mc:Fallback xmlns="">
           <p:sp>
             <p:nvSpPr>
               <p:cNvPr id="22" name="TextBox 21"/>
@@ -10075,7 +9953,7 @@
                 <a:avLst/>
               </a:prstGeom>
               <a:blipFill rotWithShape="1">
-                <a:blip r:embed="rId11"/>
+                <a:blip r:embed="rId12"/>
                 <a:stretch>
                   <a:fillRect b="-26000"/>
                 </a:stretch>
@@ -10099,16 +9977,12 @@
           </p:sp>
         </mc:Fallback>
       </mc:AlternateContent>
-      <mc:AlternateContent xmlns:mc="http://schemas.openxmlformats.org/markup-compatibility/2006">
-        <mc:Choice xmlns:a14="http://schemas.microsoft.com/office/drawing/2010/main" Requires="a14">
+      <mc:AlternateContent xmlns:mc="http://schemas.openxmlformats.org/markup-compatibility/2006" xmlns:a14="http://schemas.microsoft.com/office/drawing/2010/main">
+        <mc:Choice Requires="a14">
           <p:sp>
             <p:nvSpPr>
               <p:cNvPr id="23" name="TextBox 22">
-                <a:extLst>
-                  <a:ext uri="{FF2B5EF4-FFF2-40B4-BE49-F238E27FC236}">
-                    <ele attr="{BFBF3471-7AB1-48D8-849E-F32119BA66A2}"/>
-                  </a:ext>
-                </a:extLst>
+                <a:extLst/>
               </p:cNvPr>
               <p:cNvSpPr txBox="1"/>
               <p:nvPr/>
@@ -10239,7 +10113,7 @@
             </p:txBody>
           </p:sp>
         </mc:Choice>
-        <mc:Fallback>
+        <mc:Fallback xmlns="">
           <p:sp>
             <p:nvSpPr>
               <p:cNvPr id="23" name="TextBox 22"/>
@@ -10257,7 +10131,7 @@
                 <a:avLst/>
               </a:prstGeom>
               <a:blipFill rotWithShape="1">
-                <a:blip r:embed="rId12"/>
+                <a:blip r:embed="rId13"/>
                 <a:stretch>
                   <a:fillRect b="-23529"/>
                 </a:stretch>
@@ -10281,16 +10155,12 @@
           </p:sp>
         </mc:Fallback>
       </mc:AlternateContent>
-      <mc:AlternateContent xmlns:mc="http://schemas.openxmlformats.org/markup-compatibility/2006">
-        <mc:Choice xmlns:a14="http://schemas.microsoft.com/office/drawing/2010/main" Requires="a14">
+      <mc:AlternateContent xmlns:mc="http://schemas.openxmlformats.org/markup-compatibility/2006" xmlns:a14="http://schemas.microsoft.com/office/drawing/2010/main">
+        <mc:Choice Requires="a14">
           <p:sp>
             <p:nvSpPr>
               <p:cNvPr id="24" name="TextBox 23">
-                <a:extLst>
-                  <a:ext uri="{FF2B5EF4-FFF2-40B4-BE49-F238E27FC236}">
-                    <ele attr="{CCE91E7C-A424-4FE5-8149-15789E5537D7}"/>
-                  </a:ext>
-                </a:extLst>
+                <a:extLst/>
               </p:cNvPr>
               <p:cNvSpPr txBox="1"/>
               <p:nvPr/>
@@ -10421,7 +10291,7 @@
             </p:txBody>
           </p:sp>
         </mc:Choice>
-        <mc:Fallback>
+        <mc:Fallback xmlns="">
           <p:sp>
             <p:nvSpPr>
               <p:cNvPr id="24" name="TextBox 23"/>
@@ -10439,7 +10309,7 @@
                 <a:avLst/>
               </a:prstGeom>
               <a:blipFill rotWithShape="1">
-                <a:blip r:embed="rId13"/>
+                <a:blip r:embed="rId14"/>
                 <a:stretch>
                   <a:fillRect b="-26000"/>
                 </a:stretch>
@@ -10463,16 +10333,12 @@
           </p:sp>
         </mc:Fallback>
       </mc:AlternateContent>
-      <mc:AlternateContent xmlns:mc="http://schemas.openxmlformats.org/markup-compatibility/2006">
-        <mc:Choice xmlns:a14="http://schemas.microsoft.com/office/drawing/2010/main" Requires="a14">
+      <mc:AlternateContent xmlns:mc="http://schemas.openxmlformats.org/markup-compatibility/2006" xmlns:a14="http://schemas.microsoft.com/office/drawing/2010/main">
+        <mc:Choice Requires="a14">
           <p:sp>
             <p:nvSpPr>
               <p:cNvPr id="25" name="TextBox 24">
-                <a:extLst>
-                  <a:ext uri="{FF2B5EF4-FFF2-40B4-BE49-F238E27FC236}">
-                    <ele attr="{8DE36BF0-3AC0-4C96-8151-465DCD7A1F91}"/>
-                  </a:ext>
-                </a:extLst>
+                <a:extLst/>
               </p:cNvPr>
               <p:cNvSpPr txBox="1"/>
               <p:nvPr/>
@@ -10603,7 +10469,7 @@
             </p:txBody>
           </p:sp>
         </mc:Choice>
-        <mc:Fallback>
+        <mc:Fallback xmlns="">
           <p:sp>
             <p:nvSpPr>
               <p:cNvPr id="25" name="TextBox 24"/>
@@ -10621,7 +10487,7 @@
                 <a:avLst/>
               </a:prstGeom>
               <a:blipFill rotWithShape="1">
-                <a:blip r:embed="rId14"/>
+                <a:blip r:embed="rId15"/>
                 <a:stretch>
                   <a:fillRect b="-26000"/>
                 </a:stretch>
@@ -10645,16 +10511,12 @@
           </p:sp>
         </mc:Fallback>
       </mc:AlternateContent>
-      <mc:AlternateContent xmlns:mc="http://schemas.openxmlformats.org/markup-compatibility/2006">
-        <mc:Choice xmlns:a14="http://schemas.microsoft.com/office/drawing/2010/main" Requires="a14">
+      <mc:AlternateContent xmlns:mc="http://schemas.openxmlformats.org/markup-compatibility/2006" xmlns:a14="http://schemas.microsoft.com/office/drawing/2010/main">
+        <mc:Choice Requires="a14">
           <p:sp>
             <p:nvSpPr>
               <p:cNvPr id="26" name="TextBox 25">
-                <a:extLst>
-                  <a:ext uri="{FF2B5EF4-FFF2-40B4-BE49-F238E27FC236}">
-                    <ele attr="{F59DE665-FB92-4B32-AB0B-4F8B66841B24}"/>
-                  </a:ext>
-                </a:extLst>
+                <a:extLst/>
               </p:cNvPr>
               <p:cNvSpPr txBox="1"/>
               <p:nvPr/>
@@ -10785,7 +10647,7 @@
             </p:txBody>
           </p:sp>
         </mc:Choice>
-        <mc:Fallback>
+        <mc:Fallback xmlns="">
           <p:sp>
             <p:nvSpPr>
               <p:cNvPr id="26" name="TextBox 25"/>
@@ -10803,7 +10665,7 @@
                 <a:avLst/>
               </a:prstGeom>
               <a:blipFill rotWithShape="1">
-                <a:blip r:embed="rId15"/>
+                <a:blip r:embed="rId16"/>
                 <a:stretch>
                   <a:fillRect b="-23529"/>
                 </a:stretch>
@@ -10827,16 +10689,12 @@
           </p:sp>
         </mc:Fallback>
       </mc:AlternateContent>
-      <mc:AlternateContent xmlns:mc="http://schemas.openxmlformats.org/markup-compatibility/2006">
-        <mc:Choice xmlns:a14="http://schemas.microsoft.com/office/drawing/2010/main" Requires="a14">
+      <mc:AlternateContent xmlns:mc="http://schemas.openxmlformats.org/markup-compatibility/2006" xmlns:a14="http://schemas.microsoft.com/office/drawing/2010/main">
+        <mc:Choice Requires="a14">
           <p:sp>
             <p:nvSpPr>
               <p:cNvPr id="28" name="TextBox 27">
-                <a:extLst>
-                  <a:ext uri="{FF2B5EF4-FFF2-40B4-BE49-F238E27FC236}">
-                    <ele attr="{05651DCA-732D-4227-9C37-409A0A99642F}"/>
-                  </a:ext>
-                </a:extLst>
+                <a:extLst/>
               </p:cNvPr>
               <p:cNvSpPr txBox="1"/>
               <p:nvPr/>
@@ -10985,7 +10843,7 @@
             </p:txBody>
           </p:sp>
         </mc:Choice>
-        <mc:Fallback>
+        <mc:Fallback xmlns="">
           <p:sp>
             <p:nvSpPr>
               <p:cNvPr id="28" name="TextBox 27"/>
@@ -11003,7 +10861,7 @@
                 <a:avLst/>
               </a:prstGeom>
               <a:blipFill rotWithShape="1">
-                <a:blip r:embed="rId16"/>
+                <a:blip r:embed="rId17"/>
                 <a:stretch>
                   <a:fillRect b="-23529"/>
                 </a:stretch>
@@ -11027,16 +10885,12 @@
           </p:sp>
         </mc:Fallback>
       </mc:AlternateContent>
-      <mc:AlternateContent xmlns:mc="http://schemas.openxmlformats.org/markup-compatibility/2006">
-        <mc:Choice xmlns:a14="http://schemas.microsoft.com/office/drawing/2010/main" Requires="a14">
+      <mc:AlternateContent xmlns:mc="http://schemas.openxmlformats.org/markup-compatibility/2006" xmlns:a14="http://schemas.microsoft.com/office/drawing/2010/main">
+        <mc:Choice Requires="a14">
           <p:sp>
             <p:nvSpPr>
               <p:cNvPr id="29" name="TextBox 28">
-                <a:extLst>
-                  <a:ext uri="{FF2B5EF4-FFF2-40B4-BE49-F238E27FC236}">
-                    <ele attr="{E9D570A1-A6BD-48ED-A3E5-966B5B326E7E}"/>
-                  </a:ext>
-                </a:extLst>
+                <a:extLst/>
               </p:cNvPr>
               <p:cNvSpPr txBox="1"/>
               <p:nvPr/>
@@ -11185,7 +11039,7 @@
             </p:txBody>
           </p:sp>
         </mc:Choice>
-        <mc:Fallback>
+        <mc:Fallback xmlns="">
           <p:sp>
             <p:nvSpPr>
               <p:cNvPr id="29" name="TextBox 28"/>
@@ -11203,7 +11057,7 @@
                 <a:avLst/>
               </a:prstGeom>
               <a:blipFill rotWithShape="1">
-                <a:blip r:embed="rId17"/>
+                <a:blip r:embed="rId18"/>
                 <a:stretch>
                   <a:fillRect b="-26000"/>
                 </a:stretch>
@@ -11227,16 +11081,12 @@
           </p:sp>
         </mc:Fallback>
       </mc:AlternateContent>
-      <mc:AlternateContent xmlns:mc="http://schemas.openxmlformats.org/markup-compatibility/2006">
-        <mc:Choice xmlns:a14="http://schemas.microsoft.com/office/drawing/2010/main" Requires="a14">
+      <mc:AlternateContent xmlns:mc="http://schemas.openxmlformats.org/markup-compatibility/2006" xmlns:a14="http://schemas.microsoft.com/office/drawing/2010/main">
+        <mc:Choice Requires="a14">
           <p:sp>
             <p:nvSpPr>
               <p:cNvPr id="30" name="TextBox 29">
-                <a:extLst>
-                  <a:ext uri="{FF2B5EF4-FFF2-40B4-BE49-F238E27FC236}">
-                    <ele attr="{80DFF4EA-AA53-45BD-9C25-F0A982D06850}"/>
-                  </a:ext>
-                </a:extLst>
+                <a:extLst/>
               </p:cNvPr>
               <p:cNvSpPr txBox="1"/>
               <p:nvPr/>
@@ -11385,7 +11235,7 @@
             </p:txBody>
           </p:sp>
         </mc:Choice>
-        <mc:Fallback>
+        <mc:Fallback xmlns="">
           <p:sp>
             <p:nvSpPr>
               <p:cNvPr id="30" name="TextBox 29"/>
@@ -11403,7 +11253,7 @@
                 <a:avLst/>
               </a:prstGeom>
               <a:blipFill rotWithShape="1">
-                <a:blip r:embed="rId18"/>
+                <a:blip r:embed="rId19"/>
                 <a:stretch>
                   <a:fillRect b="-26000"/>
                 </a:stretch>
@@ -11427,16 +11277,12 @@
           </p:sp>
         </mc:Fallback>
       </mc:AlternateContent>
-      <mc:AlternateContent xmlns:mc="http://schemas.openxmlformats.org/markup-compatibility/2006">
-        <mc:Choice xmlns:a14="http://schemas.microsoft.com/office/drawing/2010/main" Requires="a14">
+      <mc:AlternateContent xmlns:mc="http://schemas.openxmlformats.org/markup-compatibility/2006" xmlns:a14="http://schemas.microsoft.com/office/drawing/2010/main">
+        <mc:Choice Requires="a14">
           <p:sp>
             <p:nvSpPr>
               <p:cNvPr id="32" name="TextBox 31">
-                <a:extLst>
-                  <a:ext uri="{FF2B5EF4-FFF2-40B4-BE49-F238E27FC236}">
-                    <ele attr="{59FBE99C-0E87-4DAC-809E-6EC3549FFFCD}"/>
-                  </a:ext>
-                </a:extLst>
+                <a:extLst/>
               </p:cNvPr>
               <p:cNvSpPr txBox="1"/>
               <p:nvPr/>
@@ -11585,7 +11431,7 @@
             </p:txBody>
           </p:sp>
         </mc:Choice>
-        <mc:Fallback>
+        <mc:Fallback xmlns="">
           <p:sp>
             <p:nvSpPr>
               <p:cNvPr id="32" name="TextBox 31"/>
@@ -11603,7 +11449,7 @@
                 <a:avLst/>
               </a:prstGeom>
               <a:blipFill rotWithShape="1">
-                <a:blip r:embed="rId19"/>
+                <a:blip r:embed="rId20"/>
                 <a:stretch>
                   <a:fillRect b="-23529"/>
                 </a:stretch>
@@ -11627,16 +11473,12 @@
           </p:sp>
         </mc:Fallback>
       </mc:AlternateContent>
-      <mc:AlternateContent xmlns:mc="http://schemas.openxmlformats.org/markup-compatibility/2006">
-        <mc:Choice xmlns:a14="http://schemas.microsoft.com/office/drawing/2010/main" Requires="a14">
+      <mc:AlternateContent xmlns:mc="http://schemas.openxmlformats.org/markup-compatibility/2006" xmlns:a14="http://schemas.microsoft.com/office/drawing/2010/main">
+        <mc:Choice Requires="a14">
           <p:sp>
             <p:nvSpPr>
               <p:cNvPr id="33" name="TextBox 32">
-                <a:extLst>
-                  <a:ext uri="{FF2B5EF4-FFF2-40B4-BE49-F238E27FC236}">
-                    <ele attr="{A08CB6D5-EFFE-4206-A73A-B5D818E35F10}"/>
-                  </a:ext>
-                </a:extLst>
+                <a:extLst/>
               </p:cNvPr>
               <p:cNvSpPr txBox="1"/>
               <p:nvPr/>
@@ -11785,7 +11627,7 @@
             </p:txBody>
           </p:sp>
         </mc:Choice>
-        <mc:Fallback>
+        <mc:Fallback xmlns="">
           <p:sp>
             <p:nvSpPr>
               <p:cNvPr id="33" name="TextBox 32"/>
@@ -11803,7 +11645,7 @@
                 <a:avLst/>
               </a:prstGeom>
               <a:blipFill rotWithShape="1">
-                <a:blip r:embed="rId20"/>
+                <a:blip r:embed="rId21"/>
                 <a:stretch>
                   <a:fillRect b="-23529"/>
                 </a:stretch>
@@ -11827,16 +11669,12 @@
           </p:sp>
         </mc:Fallback>
       </mc:AlternateContent>
-      <mc:AlternateContent xmlns:mc="http://schemas.openxmlformats.org/markup-compatibility/2006">
-        <mc:Choice xmlns:a14="http://schemas.microsoft.com/office/drawing/2010/main" Requires="a14">
+      <mc:AlternateContent xmlns:mc="http://schemas.openxmlformats.org/markup-compatibility/2006" xmlns:a14="http://schemas.microsoft.com/office/drawing/2010/main">
+        <mc:Choice Requires="a14">
           <p:sp>
             <p:nvSpPr>
               <p:cNvPr id="34" name="TextBox 33">
-                <a:extLst>
-                  <a:ext uri="{FF2B5EF4-FFF2-40B4-BE49-F238E27FC236}">
-                    <ele attr="{A207174C-8877-4F1C-8951-BDEC0200A854}"/>
-                  </a:ext>
-                </a:extLst>
+                <a:extLst/>
               </p:cNvPr>
               <p:cNvSpPr txBox="1"/>
               <p:nvPr/>
@@ -11985,7 +11823,7 @@
             </p:txBody>
           </p:sp>
         </mc:Choice>
-        <mc:Fallback>
+        <mc:Fallback xmlns="">
           <p:sp>
             <p:nvSpPr>
               <p:cNvPr id="34" name="TextBox 33"/>
@@ -12003,7 +11841,7 @@
                 <a:avLst/>
               </a:prstGeom>
               <a:blipFill rotWithShape="1">
-                <a:blip r:embed="rId21"/>
+                <a:blip r:embed="rId22"/>
                 <a:stretch>
                   <a:fillRect b="-23529"/>
                 </a:stretch>
@@ -12027,16 +11865,12 @@
           </p:sp>
         </mc:Fallback>
       </mc:AlternateContent>
-      <mc:AlternateContent xmlns:mc="http://schemas.openxmlformats.org/markup-compatibility/2006">
-        <mc:Choice xmlns:a14="http://schemas.microsoft.com/office/drawing/2010/main" Requires="a14">
+      <mc:AlternateContent xmlns:mc="http://schemas.openxmlformats.org/markup-compatibility/2006" xmlns:a14="http://schemas.microsoft.com/office/drawing/2010/main">
+        <mc:Choice Requires="a14">
           <p:sp>
             <p:nvSpPr>
               <p:cNvPr id="35" name="TextBox 34">
-                <a:extLst>
-                  <a:ext uri="{FF2B5EF4-FFF2-40B4-BE49-F238E27FC236}">
-                    <ele attr="{096146C7-D456-4363-AB50-929E65F6E46C}"/>
-                  </a:ext>
-                </a:extLst>
+                <a:extLst/>
               </p:cNvPr>
               <p:cNvSpPr txBox="1"/>
               <p:nvPr/>
@@ -12167,7 +12001,7 @@
             </p:txBody>
           </p:sp>
         </mc:Choice>
-        <mc:Fallback>
+        <mc:Fallback xmlns="">
           <p:sp>
             <p:nvSpPr>
               <p:cNvPr id="35" name="TextBox 34"/>
@@ -12185,7 +12019,7 @@
                 <a:avLst/>
               </a:prstGeom>
               <a:blipFill rotWithShape="1">
-                <a:blip r:embed="rId22"/>
+                <a:blip r:embed="rId23"/>
                 <a:stretch>
                   <a:fillRect b="-23529"/>
                 </a:stretch>
@@ -12209,16 +12043,12 @@
           </p:sp>
         </mc:Fallback>
       </mc:AlternateContent>
-      <mc:AlternateContent xmlns:mc="http://schemas.openxmlformats.org/markup-compatibility/2006">
-        <mc:Choice xmlns:a14="http://schemas.microsoft.com/office/drawing/2010/main" Requires="a14">
+      <mc:AlternateContent xmlns:mc="http://schemas.openxmlformats.org/markup-compatibility/2006" xmlns:a14="http://schemas.microsoft.com/office/drawing/2010/main">
+        <mc:Choice Requires="a14">
           <p:sp>
             <p:nvSpPr>
               <p:cNvPr id="36" name="TextBox 35">
-                <a:extLst>
-                  <a:ext uri="{FF2B5EF4-FFF2-40B4-BE49-F238E27FC236}">
-                    <ele attr="{0C23E3DB-26C0-4BB5-8FF8-6BED86ED9987}"/>
-                  </a:ext>
-                </a:extLst>
+                <a:extLst/>
               </p:cNvPr>
               <p:cNvSpPr txBox="1"/>
               <p:nvPr/>
@@ -12367,7 +12197,7 @@
             </p:txBody>
           </p:sp>
         </mc:Choice>
-        <mc:Fallback>
+        <mc:Fallback xmlns="">
           <p:sp>
             <p:nvSpPr>
               <p:cNvPr id="36" name="TextBox 35"/>
@@ -12385,7 +12215,7 @@
                 <a:avLst/>
               </a:prstGeom>
               <a:blipFill rotWithShape="1">
-                <a:blip r:embed="rId23"/>
+                <a:blip r:embed="rId24"/>
                 <a:stretch>
                   <a:fillRect b="-23529"/>
                 </a:stretch>
@@ -12409,16 +12239,12 @@
           </p:sp>
         </mc:Fallback>
       </mc:AlternateContent>
-      <mc:AlternateContent xmlns:mc="http://schemas.openxmlformats.org/markup-compatibility/2006">
-        <mc:Choice xmlns:a14="http://schemas.microsoft.com/office/drawing/2010/main" Requires="a14">
+      <mc:AlternateContent xmlns:mc="http://schemas.openxmlformats.org/markup-compatibility/2006" xmlns:a14="http://schemas.microsoft.com/office/drawing/2010/main">
+        <mc:Choice Requires="a14">
           <p:sp>
             <p:nvSpPr>
               <p:cNvPr id="37" name="TextBox 36">
-                <a:extLst>
-                  <a:ext uri="{FF2B5EF4-FFF2-40B4-BE49-F238E27FC236}">
-                    <ele attr="{D575E787-DAFE-478C-8190-CEB887AC80C4}"/>
-                  </a:ext>
-                </a:extLst>
+                <a:extLst/>
               </p:cNvPr>
               <p:cNvSpPr txBox="1"/>
               <p:nvPr/>
@@ -12567,7 +12393,7 @@
             </p:txBody>
           </p:sp>
         </mc:Choice>
-        <mc:Fallback>
+        <mc:Fallback xmlns="">
           <p:sp>
             <p:nvSpPr>
               <p:cNvPr id="37" name="TextBox 36"/>
@@ -12585,7 +12411,7 @@
                 <a:avLst/>
               </a:prstGeom>
               <a:blipFill rotWithShape="1">
-                <a:blip r:embed="rId24"/>
+                <a:blip r:embed="rId25"/>
                 <a:stretch>
                   <a:fillRect b="-26000"/>
                 </a:stretch>
@@ -12750,16 +12576,12 @@
           </a:p>
         </p:txBody>
       </p:sp>
-      <mc:AlternateContent xmlns:mc="http://schemas.openxmlformats.org/markup-compatibility/2006">
-        <mc:Choice xmlns:a14="http://schemas.microsoft.com/office/drawing/2010/main" Requires="a14">
+      <mc:AlternateContent xmlns:mc="http://schemas.openxmlformats.org/markup-compatibility/2006" xmlns:a14="http://schemas.microsoft.com/office/drawing/2010/main">
+        <mc:Choice Requires="a14">
           <p:sp>
             <p:nvSpPr>
               <p:cNvPr id="2" name="TextBox 1">
-                <a:extLst>
-                  <a:ext uri="{FF2B5EF4-FFF2-40B4-BE49-F238E27FC236}">
-                    <ele attr="{195A16CF-B6CE-4131-837C-63F61E85BDA1}"/>
-                  </a:ext>
-                </a:extLst>
+                <a:extLst/>
               </p:cNvPr>
               <p:cNvSpPr txBox="1"/>
               <p:nvPr/>
@@ -12817,7 +12639,7 @@
             </p:txBody>
           </p:sp>
         </mc:Choice>
-        <mc:Fallback>
+        <mc:Fallback xmlns="">
           <p:sp>
             <p:nvSpPr>
               <p:cNvPr id="2" name="TextBox 1"/>
@@ -12835,7 +12657,7 @@
                 <a:avLst/>
               </a:prstGeom>
               <a:blipFill rotWithShape="1">
-                <a:blip r:embed="rId1"/>
+                <a:blip r:embed="rId2"/>
                 <a:stretch>
                   <a:fillRect l="-15942" r="-15942" b="-6557"/>
                 </a:stretch>
@@ -12859,16 +12681,12 @@
           </p:sp>
         </mc:Fallback>
       </mc:AlternateContent>
-      <mc:AlternateContent xmlns:mc="http://schemas.openxmlformats.org/markup-compatibility/2006">
-        <mc:Choice xmlns:a14="http://schemas.microsoft.com/office/drawing/2010/main" Requires="a14">
+      <mc:AlternateContent xmlns:mc="http://schemas.openxmlformats.org/markup-compatibility/2006" xmlns:a14="http://schemas.microsoft.com/office/drawing/2010/main">
+        <mc:Choice Requires="a14">
           <p:sp>
             <p:nvSpPr>
               <p:cNvPr id="4" name="TextBox 3">
-                <a:extLst>
-                  <a:ext uri="{FF2B5EF4-FFF2-40B4-BE49-F238E27FC236}">
-                    <ele attr="{40EE7A0F-8A61-439C-AC46-18D11B1120D1}"/>
-                  </a:ext>
-                </a:extLst>
+                <a:extLst/>
               </p:cNvPr>
               <p:cNvSpPr txBox="1"/>
               <p:nvPr/>
@@ -12944,7 +12762,7 @@
             </p:txBody>
           </p:sp>
         </mc:Choice>
-        <mc:Fallback>
+        <mc:Fallback xmlns="">
           <p:sp>
             <p:nvSpPr>
               <p:cNvPr id="4" name="TextBox 3"/>
@@ -12962,7 +12780,7 @@
                 <a:avLst/>
               </a:prstGeom>
               <a:blipFill rotWithShape="1">
-                <a:blip r:embed="rId2"/>
+                <a:blip r:embed="rId3"/>
                 <a:stretch>
                   <a:fillRect l="-4878" r="-5366" b="-8333"/>
                 </a:stretch>
@@ -12986,16 +12804,12 @@
           </p:sp>
         </mc:Fallback>
       </mc:AlternateContent>
-      <mc:AlternateContent xmlns:mc="http://schemas.openxmlformats.org/markup-compatibility/2006">
-        <mc:Choice xmlns:a14="http://schemas.microsoft.com/office/drawing/2010/main" Requires="a14">
+      <mc:AlternateContent xmlns:mc="http://schemas.openxmlformats.org/markup-compatibility/2006" xmlns:a14="http://schemas.microsoft.com/office/drawing/2010/main">
+        <mc:Choice Requires="a14">
           <p:sp>
             <p:nvSpPr>
               <p:cNvPr id="6" name="TextBox 5">
-                <a:extLst>
-                  <a:ext uri="{FF2B5EF4-FFF2-40B4-BE49-F238E27FC236}">
-                    <ele attr="{E6ACA351-C698-43A3-AA4E-57D8B7E2FF66}"/>
-                  </a:ext>
-                </a:extLst>
+                <a:extLst/>
               </p:cNvPr>
               <p:cNvSpPr txBox="1"/>
               <p:nvPr/>
@@ -13071,7 +12885,7 @@
             </p:txBody>
           </p:sp>
         </mc:Choice>
-        <mc:Fallback>
+        <mc:Fallback xmlns="">
           <p:sp>
             <p:nvSpPr>
               <p:cNvPr id="6" name="TextBox 5"/>
@@ -13089,7 +12903,7 @@
                 <a:avLst/>
               </a:prstGeom>
               <a:blipFill rotWithShape="1">
-                <a:blip r:embed="rId3"/>
+                <a:blip r:embed="rId4"/>
                 <a:stretch>
                   <a:fillRect l="-4878" r="-5366" b="-6557"/>
                 </a:stretch>
@@ -13113,16 +12927,12 @@
           </p:sp>
         </mc:Fallback>
       </mc:AlternateContent>
-      <mc:AlternateContent xmlns:mc="http://schemas.openxmlformats.org/markup-compatibility/2006">
-        <mc:Choice xmlns:a14="http://schemas.microsoft.com/office/drawing/2010/main" Requires="a14">
+      <mc:AlternateContent xmlns:mc="http://schemas.openxmlformats.org/markup-compatibility/2006" xmlns:a14="http://schemas.microsoft.com/office/drawing/2010/main">
+        <mc:Choice Requires="a14">
           <p:sp>
             <p:nvSpPr>
               <p:cNvPr id="8" name="TextBox 7">
-                <a:extLst>
-                  <a:ext uri="{FF2B5EF4-FFF2-40B4-BE49-F238E27FC236}">
-                    <ele attr="{607968E1-5E1F-44D8-9DB9-3F61D679A5EF}"/>
-                  </a:ext>
-                </a:extLst>
+                <a:extLst/>
               </p:cNvPr>
               <p:cNvSpPr txBox="1"/>
               <p:nvPr/>
@@ -13198,7 +13008,7 @@
             </p:txBody>
           </p:sp>
         </mc:Choice>
-        <mc:Fallback>
+        <mc:Fallback xmlns="">
           <p:sp>
             <p:nvSpPr>
               <p:cNvPr id="8" name="TextBox 7"/>
@@ -13216,7 +13026,7 @@
                 <a:avLst/>
               </a:prstGeom>
               <a:blipFill rotWithShape="1">
-                <a:blip r:embed="rId4"/>
+                <a:blip r:embed="rId5"/>
                 <a:stretch>
                   <a:fillRect l="-4545" r="-5051" b="-6667"/>
                 </a:stretch>
@@ -13240,16 +13050,12 @@
           </p:sp>
         </mc:Fallback>
       </mc:AlternateContent>
-      <mc:AlternateContent xmlns:mc="http://schemas.openxmlformats.org/markup-compatibility/2006">
-        <mc:Choice xmlns:a14="http://schemas.microsoft.com/office/drawing/2010/main" Requires="a14">
+      <mc:AlternateContent xmlns:mc="http://schemas.openxmlformats.org/markup-compatibility/2006" xmlns:a14="http://schemas.microsoft.com/office/drawing/2010/main">
+        <mc:Choice Requires="a14">
           <p:sp>
             <p:nvSpPr>
               <p:cNvPr id="10" name="TextBox 9">
-                <a:extLst>
-                  <a:ext uri="{FF2B5EF4-FFF2-40B4-BE49-F238E27FC236}">
-                    <ele attr="{E9215AA9-E856-430D-A0AA-7CB05F9AF6EF}"/>
-                  </a:ext>
-                </a:extLst>
+                <a:extLst/>
               </p:cNvPr>
               <p:cNvSpPr txBox="1"/>
               <p:nvPr/>
@@ -13325,7 +13131,7 @@
             </p:txBody>
           </p:sp>
         </mc:Choice>
-        <mc:Fallback>
+        <mc:Fallback xmlns="">
           <p:sp>
             <p:nvSpPr>
               <p:cNvPr id="10" name="TextBox 9"/>
@@ -13343,7 +13149,7 @@
                 <a:avLst/>
               </a:prstGeom>
               <a:blipFill rotWithShape="1">
-                <a:blip r:embed="rId5"/>
+                <a:blip r:embed="rId6"/>
                 <a:stretch>
                   <a:fillRect l="-5051" r="-4545" b="-6557"/>
                 </a:stretch>
@@ -13367,16 +13173,12 @@
           </p:sp>
         </mc:Fallback>
       </mc:AlternateContent>
-      <mc:AlternateContent xmlns:mc="http://schemas.openxmlformats.org/markup-compatibility/2006">
-        <mc:Choice xmlns:a14="http://schemas.microsoft.com/office/drawing/2010/main" Requires="a14">
+      <mc:AlternateContent xmlns:mc="http://schemas.openxmlformats.org/markup-compatibility/2006" xmlns:a14="http://schemas.microsoft.com/office/drawing/2010/main">
+        <mc:Choice Requires="a14">
           <p:sp>
             <p:nvSpPr>
               <p:cNvPr id="12" name="TextBox 11">
-                <a:extLst>
-                  <a:ext uri="{FF2B5EF4-FFF2-40B4-BE49-F238E27FC236}">
-                    <ele attr="{BE577278-F2F8-4B68-AB28-EB6B05348DC7}"/>
-                  </a:ext>
-                </a:extLst>
+                <a:extLst/>
               </p:cNvPr>
               <p:cNvSpPr txBox="1"/>
               <p:nvPr/>
@@ -13434,7 +13236,7 @@
             </p:txBody>
           </p:sp>
         </mc:Choice>
-        <mc:Fallback>
+        <mc:Fallback xmlns="">
           <p:sp>
             <p:nvSpPr>
               <p:cNvPr id="12" name="TextBox 11"/>
@@ -13452,7 +13254,7 @@
                 <a:avLst/>
               </a:prstGeom>
               <a:blipFill rotWithShape="1">
-                <a:blip r:embed="rId6"/>
+                <a:blip r:embed="rId7"/>
                 <a:stretch>
                   <a:fillRect l="-16129" r="-17742" b="-6557"/>
                 </a:stretch>
@@ -13493,7 +13295,14 @@
         <p:cNvGrpSpPr/>
         <p:nvPr/>
       </p:nvGrpSpPr>
-      <p:grpSpPr/>
+      <p:grpSpPr>
+        <a:xfrm>
+          <a:off x="0" y="0"/>
+          <a:ext cx="0" cy="0"/>
+          <a:chOff x="0" y="0"/>
+          <a:chExt cx="0" cy="0"/>
+        </a:xfrm>
+      </p:grpSpPr>
       <p:pic>
         <p:nvPicPr>
           <p:cNvPr id="8" name="图片 7"/>
@@ -13503,7 +13312,7 @@
           <p:nvPr/>
         </p:nvPicPr>
         <p:blipFill>
-          <a:blip r:embed="rId1"/>
+          <a:blip r:embed="rId3"/>
           <a:stretch>
             <a:fillRect/>
           </a:stretch>
@@ -13595,7 +13404,7 @@
       <p:graphicFrame>
         <p:nvGraphicFramePr>
           <p:cNvPr id="11" name="对象 10">
-            <a:hlinkClick r:id="" action="ppaction://ole?verb="/>
+            <a:hlinkClick r:id="" action="ppaction://ole?verb=0"/>
           </p:cNvPr>
           <p:cNvGraphicFramePr>
             <a:graphicFrameLocks noChangeAspect="1"/>
@@ -13610,12 +13419,12 @@
           <a:graphicData uri="http://schemas.openxmlformats.org/presentationml/2006/ole">
             <mc:AlternateContent xmlns:mc="http://schemas.openxmlformats.org/markup-compatibility/2006">
               <mc:Choice xmlns:v="urn:schemas-microsoft-com:vml" Requires="v">
-                <p:oleObj spid="_x0000_s1025" name="" r:id="rId2" imgW="177165" imgH="609600" progId="Equation.KSEE3">
+                <p:oleObj spid="_x0000_s1031" r:id="rId4" imgW="177165" imgH="609600" progId="Equation.KSEE3">
                   <p:embed/>
                 </p:oleObj>
               </mc:Choice>
               <mc:Fallback>
-                <p:oleObj name="" r:id="rId2" imgW="177165" imgH="609600" progId="Equation.KSEE3">
+                <p:oleObj r:id="rId4" imgW="177165" imgH="609600" progId="Equation.KSEE3">
                   <p:embed/>
                   <p:pic>
                     <p:nvPicPr>
@@ -13624,7 +13433,7 @@
                       <p:nvPr/>
                     </p:nvPicPr>
                     <p:blipFill>
-                      <a:blip r:embed="rId3"/>
+                      <a:blip r:embed="rId5"/>
                       <a:stretch>
                         <a:fillRect/>
                       </a:stretch>
@@ -13648,7 +13457,7 @@
       <p:graphicFrame>
         <p:nvGraphicFramePr>
           <p:cNvPr id="12" name="对象 11">
-            <a:hlinkClick r:id="" action="ppaction://ole?verb="/>
+            <a:hlinkClick r:id="" action="ppaction://ole?verb=0"/>
           </p:cNvPr>
           <p:cNvGraphicFramePr>
             <a:graphicFrameLocks noChangeAspect="1"/>
@@ -13663,12 +13472,12 @@
           <a:graphicData uri="http://schemas.openxmlformats.org/presentationml/2006/ole">
             <mc:AlternateContent xmlns:mc="http://schemas.openxmlformats.org/markup-compatibility/2006">
               <mc:Choice xmlns:v="urn:schemas-microsoft-com:vml" Requires="v">
-                <p:oleObj spid="_x0000_s2" name="" r:id="rId4" imgW="190500" imgH="609600" progId="Equation.KSEE3">
+                <p:oleObj spid="_x0000_s1032" r:id="rId6" imgW="190500" imgH="609600" progId="Equation.KSEE3">
                   <p:embed/>
                 </p:oleObj>
               </mc:Choice>
               <mc:Fallback>
-                <p:oleObj name="" r:id="rId4" imgW="190500" imgH="609600" progId="Equation.KSEE3">
+                <p:oleObj r:id="rId6" imgW="190500" imgH="609600" progId="Equation.KSEE3">
                   <p:embed/>
                   <p:pic>
                     <p:nvPicPr>
@@ -13677,7 +13486,7 @@
                       <p:nvPr/>
                     </p:nvPicPr>
                     <p:blipFill>
-                      <a:blip r:embed="rId5"/>
+                      <a:blip r:embed="rId7"/>
                       <a:stretch>
                         <a:fillRect/>
                       </a:stretch>
@@ -13754,12 +13563,12 @@
           <a:bodyPr wrap="square" rtlCol="0">
             <a:spAutoFit/>
           </a:bodyPr>
+          <a:lstStyle/>
           <a:p>
             <a:r>
               <a:rPr lang="en-US" altLang="zh-CN"/>
               <a:t>Head</a:t>
             </a:r>
-            <a:endParaRPr lang="en-US" altLang="zh-CN"/>
           </a:p>
         </p:txBody>
       </p:sp>
@@ -13771,7 +13580,7 @@
         </p:nvSpPr>
         <p:spPr>
           <a:xfrm rot="5400000">
-            <a:off x="5093335" y="3597910"/>
+            <a:off x="5062316" y="3647609"/>
             <a:ext cx="481965" cy="607060"/>
           </a:xfrm>
           <a:prstGeom prst="moon">
@@ -13795,6 +13604,7 @@
         </p:style>
         <p:txBody>
           <a:bodyPr rtlCol="0" anchor="ctr"/>
+          <a:lstStyle/>
           <a:p>
             <a:pPr algn="ctr"/>
             <a:endParaRPr lang="zh-CN" altLang="en-US"/>
@@ -13818,7 +13628,14 @@
         <p:cNvGrpSpPr/>
         <p:nvPr/>
       </p:nvGrpSpPr>
-      <p:grpSpPr/>
+      <p:grpSpPr>
+        <a:xfrm>
+          <a:off x="0" y="0"/>
+          <a:ext cx="0" cy="0"/>
+          <a:chOff x="0" y="0"/>
+          <a:chExt cx="0" cy="0"/>
+        </a:xfrm>
+      </p:grpSpPr>
       <p:cxnSp>
         <p:nvCxnSpPr>
           <p:cNvPr id="64" name="Straight Connector 63"/>
@@ -13896,6 +13713,7 @@
         </p:style>
         <p:txBody>
           <a:bodyPr rtlCol="0" anchor="ctr"/>
+          <a:lstStyle/>
           <a:p>
             <a:pPr algn="ctr"/>
             <a:endParaRPr lang="zh-CN" altLang="en-US"/>
@@ -13935,6 +13753,7 @@
         </p:style>
         <p:txBody>
           <a:bodyPr rtlCol="0" anchor="ctr"/>
+          <a:lstStyle/>
           <a:p>
             <a:pPr algn="ctr"/>
             <a:endParaRPr lang="zh-CN" altLang="en-US"/>
@@ -13961,12 +13780,12 @@
           <a:bodyPr wrap="square" rtlCol="0">
             <a:spAutoFit/>
           </a:bodyPr>
+          <a:lstStyle/>
           <a:p>
             <a:r>
               <a:rPr lang="en-US" altLang="zh-CN"/>
               <a:t>Bary Centre</a:t>
             </a:r>
-            <a:endParaRPr lang="en-US" altLang="zh-CN"/>
           </a:p>
         </p:txBody>
       </p:sp>
@@ -14229,6 +14048,8 @@
       </a:bgFillStyleLst>
     </a:fmtScheme>
   </a:themeElements>
+  <a:objectDefaults/>
+  <a:extraClrSchemeLst/>
   <a:extLst>
     <a:ext uri="{05A4C25C-085E-4340-85A3-A5531E510DB2}">
       <thm15:themeFamily xmlns:thm15="http://schemas.microsoft.com/office/thememl/2012/main" name="Office Theme" id="{62F939B6-93AF-4DB8-9C6B-D6C7DFDC589F}" vid="{4A3C46E8-61CC-4603-A589-7422A47A8E4A}"/>
@@ -14488,6 +14309,8 @@
       </a:bgFillStyleLst>
     </a:fmtScheme>
   </a:themeElements>
+  <a:objectDefaults/>
+  <a:extraClrSchemeLst/>
   <a:extLst>
     <a:ext uri="{05A4C25C-085E-4340-85A3-A5531E510DB2}">
       <thm15:themeFamily xmlns:thm15="http://schemas.microsoft.com/office/thememl/2012/main" name="Office Theme" id="{62F939B6-93AF-4DB8-9C6B-D6C7DFDC589F}" vid="{4A3C46E8-61CC-4603-A589-7422A47A8E4A}"/>

</xml_diff>